<commit_message>
[SQL] Update for Java Academy Course 2016
</commit_message>
<xml_diff>
--- a/SQL-master/Exercises/SQL [3] Exercise - Joins - solved.pptx
+++ b/SQL-master/Exercises/SQL [3] Exercise - Joins - solved.pptx
@@ -259,7 +259,7 @@
           <a:p>
             <a:fld id="{E23C31A4-E588-4D7D-8556-3E7A80E3618E}" type="datetimeFigureOut">
               <a:rPr lang="es-MX" smtClean="0"/>
-              <a:t>28/08/2015</a:t>
+              <a:t>23/11/2016</a:t>
             </a:fld>
             <a:endParaRPr lang="es-MX"/>
           </a:p>
@@ -437,7 +437,7 @@
               <a:pPr>
                 <a:defRPr/>
               </a:pPr>
-              <a:t>28/08/2015</a:t>
+              <a:t>23/11/2016</a:t>
             </a:fld>
             <a:endParaRPr lang="es-MX" dirty="0"/>
           </a:p>
@@ -473,7 +473,7 @@
           <a:lstStyle/>
           <a:p>
             <a:pPr lvl="0"/>
-            <a:endParaRPr lang="es-MX" noProof="0" dirty="0" smtClean="0"/>
+            <a:endParaRPr lang="es-MX" noProof="0" dirty="0"/>
           </a:p>
         </p:txBody>
       </p:sp>
@@ -504,38 +504,38 @@
           <a:p>
             <a:pPr lvl="0"/>
             <a:r>
-              <a:rPr lang="en-US" noProof="0" smtClean="0"/>
+              <a:rPr lang="en-US" noProof="0"/>
               <a:t>Click to edit Master text styles</a:t>
             </a:r>
           </a:p>
           <a:p>
             <a:pPr lvl="1"/>
             <a:r>
-              <a:rPr lang="en-US" noProof="0" smtClean="0"/>
+              <a:rPr lang="en-US" noProof="0"/>
               <a:t>Second level</a:t>
             </a:r>
           </a:p>
           <a:p>
             <a:pPr lvl="2"/>
             <a:r>
-              <a:rPr lang="en-US" noProof="0" smtClean="0"/>
+              <a:rPr lang="en-US" noProof="0"/>
               <a:t>Third level</a:t>
             </a:r>
           </a:p>
           <a:p>
             <a:pPr lvl="3"/>
             <a:r>
-              <a:rPr lang="en-US" noProof="0" smtClean="0"/>
+              <a:rPr lang="en-US" noProof="0"/>
               <a:t>Fourth level</a:t>
             </a:r>
           </a:p>
           <a:p>
             <a:pPr lvl="4"/>
             <a:r>
-              <a:rPr lang="en-US" noProof="0" smtClean="0"/>
+              <a:rPr lang="en-US" noProof="0"/>
               <a:t>Fifth level</a:t>
             </a:r>
-            <a:endParaRPr lang="es-MX" noProof="0" smtClean="0"/>
+            <a:endParaRPr lang="es-MX" noProof="0"/>
           </a:p>
         </p:txBody>
       </p:sp>
@@ -924,10 +924,9 @@
           </a:lstStyle>
           <a:p>
             <a:r>
-              <a:rPr lang="es-MX" noProof="0" smtClean="0"/>
+              <a:rPr lang="es-MX" noProof="0"/>
               <a:t>Click To Edit Master Title Style</a:t>
             </a:r>
-            <a:endParaRPr lang="es-MX" noProof="0"/>
           </a:p>
         </p:txBody>
       </p:sp>
@@ -996,14 +995,14 @@
           <a:p>
             <a:pPr lvl="0"/>
             <a:r>
-              <a:rPr lang="en-US" noProof="0" smtClean="0"/>
+              <a:rPr lang="en-US" noProof="0"/>
               <a:t>Click to edit Master text styles</a:t>
             </a:r>
           </a:p>
           <a:p>
             <a:pPr lvl="1"/>
             <a:r>
-              <a:rPr lang="en-US" noProof="0" smtClean="0"/>
+              <a:rPr lang="en-US" noProof="0"/>
               <a:t>Second level</a:t>
             </a:r>
           </a:p>
@@ -1039,7 +1038,7 @@
           <a:p>
             <a:pPr algn="l"/>
             <a:r>
-              <a:rPr lang="es-MX" sz="800" noProof="0" smtClean="0">
+              <a:rPr lang="es-MX" sz="800" noProof="0">
                 <a:solidFill>
                   <a:srgbClr val="FFFFFF"/>
                 </a:solidFill>
@@ -1047,12 +1046,6 @@
               </a:rPr>
               <a:t>Todos los Derechos Reservados © Valores Corporativos Softtek S.A. de C.V. 2015. Interno.</a:t>
             </a:r>
-            <a:endParaRPr lang="es-MX" sz="800" noProof="0">
-              <a:solidFill>
-                <a:srgbClr val="FFFFFF"/>
-              </a:solidFill>
-              <a:cs typeface="Arial" charset="0"/>
-            </a:endParaRPr>
           </a:p>
         </p:txBody>
       </p:sp>
@@ -1135,13 +1128,6 @@
   <p:clrMapOvr>
     <a:masterClrMapping/>
   </p:clrMapOvr>
-  <p:timing>
-    <p:tnLst>
-      <p:par>
-        <p:cTn id="1" dur="indefinite" restart="never" nodeType="tmRoot"/>
-      </p:par>
-    </p:tnLst>
-  </p:timing>
 </p:sldLayout>
 </file>
 
@@ -1202,7 +1188,7 @@
           <a:p>
             <a:pPr lvl="0"/>
             <a:r>
-              <a:rPr lang="es-MX" noProof="0" smtClean="0"/>
+              <a:rPr lang="es-MX" noProof="0"/>
               <a:t>Click to edit Master title style</a:t>
             </a:r>
           </a:p>
@@ -1264,13 +1250,6 @@
   <p:clrMapOvr>
     <a:masterClrMapping/>
   </p:clrMapOvr>
-  <p:timing>
-    <p:tnLst>
-      <p:par>
-        <p:cTn id="1" dur="indefinite" restart="never" nodeType="tmRoot"/>
-      </p:par>
-    </p:tnLst>
-  </p:timing>
 </p:sldLayout>
 </file>
 
@@ -1398,7 +1377,7 @@
               <a:defRPr/>
             </a:pPr>
             <a:r>
-              <a:rPr kumimoji="0" lang="es-MX" sz="1800" b="0" i="0" u="none" strike="noStrike" kern="1200" cap="none" spc="0" normalizeH="0" baseline="0" noProof="0" smtClean="0">
+              <a:rPr kumimoji="0" lang="es-MX" sz="1800" b="0" i="0" u="none" strike="noStrike" kern="1200" cap="none" spc="0" normalizeH="0" baseline="0" noProof="0">
                 <a:ln>
                   <a:noFill/>
                 </a:ln>
@@ -1437,7 +1416,7 @@
               <a:defRPr/>
             </a:pPr>
             <a:r>
-              <a:rPr kumimoji="0" lang="es-MX" sz="1600" b="0" i="0" u="none" strike="noStrike" kern="1200" cap="none" spc="0" normalizeH="0" baseline="0" noProof="0" smtClean="0">
+              <a:rPr kumimoji="0" lang="es-MX" sz="1600" b="0" i="0" u="none" strike="noStrike" kern="1200" cap="none" spc="0" normalizeH="0" baseline="0" noProof="0">
                 <a:ln>
                   <a:noFill/>
                 </a:ln>
@@ -1476,7 +1455,7 @@
               <a:defRPr/>
             </a:pPr>
             <a:r>
-              <a:rPr kumimoji="0" lang="es-MX" sz="1400" b="0" i="0" u="none" strike="noStrike" kern="1200" cap="none" spc="0" normalizeH="0" baseline="0" noProof="0" smtClean="0">
+              <a:rPr kumimoji="0" lang="es-MX" sz="1400" b="0" i="0" u="none" strike="noStrike" kern="1200" cap="none" spc="0" normalizeH="0" baseline="0" noProof="0">
                 <a:ln>
                   <a:noFill/>
                 </a:ln>
@@ -1515,7 +1494,7 @@
               <a:defRPr/>
             </a:pPr>
             <a:r>
-              <a:rPr kumimoji="0" lang="es-MX" sz="1200" b="0" i="0" u="none" strike="noStrike" kern="1200" cap="none" spc="0" normalizeH="0" baseline="0" noProof="0" smtClean="0">
+              <a:rPr kumimoji="0" lang="es-MX" sz="1200" b="0" i="0" u="none" strike="noStrike" kern="1200" cap="none" spc="0" normalizeH="0" baseline="0" noProof="0">
                 <a:ln>
                   <a:noFill/>
                 </a:ln>
@@ -1569,7 +1548,7 @@
           <a:p>
             <a:pPr lvl="0"/>
             <a:r>
-              <a:rPr lang="es-MX" noProof="0" smtClean="0"/>
+              <a:rPr lang="es-MX" noProof="0"/>
               <a:t>Click to edit Master title style</a:t>
             </a:r>
           </a:p>
@@ -1631,13 +1610,6 @@
   <p:clrMapOvr>
     <a:masterClrMapping/>
   </p:clrMapOvr>
-  <p:timing>
-    <p:tnLst>
-      <p:par>
-        <p:cTn id="1" dur="indefinite" restart="never" nodeType="tmRoot"/>
-      </p:par>
-    </p:tnLst>
-  </p:timing>
 </p:sldLayout>
 </file>
 
@@ -1780,7 +1752,7 @@
               <a:defRPr/>
             </a:pPr>
             <a:r>
-              <a:rPr kumimoji="0" lang="es-MX" sz="1800" b="0" i="0" u="none" strike="noStrike" kern="1200" cap="none" spc="0" normalizeH="0" baseline="0" noProof="0" smtClean="0">
+              <a:rPr kumimoji="0" lang="es-MX" sz="1800" b="0" i="0" u="none" strike="noStrike" kern="1200" cap="none" spc="0" normalizeH="0" baseline="0" noProof="0">
                 <a:ln>
                   <a:noFill/>
                 </a:ln>
@@ -1819,7 +1791,7 @@
               <a:defRPr/>
             </a:pPr>
             <a:r>
-              <a:rPr kumimoji="0" lang="es-MX" sz="1600" b="0" i="0" u="none" strike="noStrike" kern="1200" cap="none" spc="0" normalizeH="0" baseline="0" noProof="0" smtClean="0">
+              <a:rPr kumimoji="0" lang="es-MX" sz="1600" b="0" i="0" u="none" strike="noStrike" kern="1200" cap="none" spc="0" normalizeH="0" baseline="0" noProof="0">
                 <a:ln>
                   <a:noFill/>
                 </a:ln>
@@ -1858,7 +1830,7 @@
               <a:defRPr/>
             </a:pPr>
             <a:r>
-              <a:rPr kumimoji="0" lang="es-MX" sz="1400" b="0" i="0" u="none" strike="noStrike" kern="1200" cap="none" spc="0" normalizeH="0" baseline="0" noProof="0" smtClean="0">
+              <a:rPr kumimoji="0" lang="es-MX" sz="1400" b="0" i="0" u="none" strike="noStrike" kern="1200" cap="none" spc="0" normalizeH="0" baseline="0" noProof="0">
                 <a:ln>
                   <a:noFill/>
                 </a:ln>
@@ -1897,7 +1869,7 @@
               <a:defRPr/>
             </a:pPr>
             <a:r>
-              <a:rPr kumimoji="0" lang="es-MX" sz="1200" b="0" i="0" u="none" strike="noStrike" kern="1200" cap="none" spc="0" normalizeH="0" baseline="0" noProof="0" smtClean="0">
+              <a:rPr kumimoji="0" lang="es-MX" sz="1200" b="0" i="0" u="none" strike="noStrike" kern="1200" cap="none" spc="0" normalizeH="0" baseline="0" noProof="0">
                 <a:ln>
                   <a:noFill/>
                 </a:ln>
@@ -1985,28 +1957,28 @@
               <a:defRPr/>
             </a:pPr>
             <a:r>
-              <a:rPr lang="es-MX" noProof="0" smtClean="0"/>
+              <a:rPr lang="es-MX" noProof="0"/>
               <a:t>Click to edit Master text styles</a:t>
             </a:r>
           </a:p>
           <a:p>
             <a:pPr lvl="1"/>
             <a:r>
-              <a:rPr lang="es-MX" noProof="0" smtClean="0"/>
+              <a:rPr lang="es-MX" noProof="0"/>
               <a:t>Second level</a:t>
             </a:r>
           </a:p>
           <a:p>
             <a:pPr lvl="2"/>
             <a:r>
-              <a:rPr lang="es-MX" noProof="0" smtClean="0"/>
+              <a:rPr lang="es-MX" noProof="0"/>
               <a:t>Third level</a:t>
             </a:r>
           </a:p>
           <a:p>
             <a:pPr lvl="3"/>
             <a:r>
-              <a:rPr lang="es-MX" noProof="0" smtClean="0"/>
+              <a:rPr lang="es-MX" noProof="0"/>
               <a:t>Fourth level</a:t>
             </a:r>
           </a:p>
@@ -2052,7 +2024,7 @@
           <a:p>
             <a:pPr lvl="0"/>
             <a:r>
-              <a:rPr lang="es-MX" noProof="0" smtClean="0"/>
+              <a:rPr lang="es-MX" noProof="0"/>
               <a:t>Click to edit Master title style</a:t>
             </a:r>
           </a:p>
@@ -2114,13 +2086,6 @@
   <p:clrMapOvr>
     <a:masterClrMapping/>
   </p:clrMapOvr>
-  <p:timing>
-    <p:tnLst>
-      <p:par>
-        <p:cTn id="1" dur="indefinite" restart="never" nodeType="tmRoot"/>
-      </p:par>
-    </p:tnLst>
-  </p:timing>
 </p:sldLayout>
 </file>
 
@@ -2266,7 +2231,7 @@
           <a:p>
             <a:pPr lvl="0"/>
             <a:r>
-              <a:rPr lang="es-MX" noProof="0" smtClean="0"/>
+              <a:rPr lang="es-MX" noProof="0"/>
               <a:t>Click to edit Master text styles</a:t>
             </a:r>
           </a:p>
@@ -2312,7 +2277,7 @@
           <a:p>
             <a:pPr lvl="0"/>
             <a:r>
-              <a:rPr lang="es-MX" noProof="0" smtClean="0"/>
+              <a:rPr lang="es-MX" noProof="0"/>
               <a:t>Click to edit Master title style</a:t>
             </a:r>
           </a:p>
@@ -2374,13 +2339,6 @@
   <p:clrMapOvr>
     <a:masterClrMapping/>
   </p:clrMapOvr>
-  <p:timing>
-    <p:tnLst>
-      <p:par>
-        <p:cTn id="1" dur="indefinite" restart="never" nodeType="tmRoot"/>
-      </p:par>
-    </p:tnLst>
-  </p:timing>
 </p:sldLayout>
 </file>
 
@@ -2527,7 +2485,7 @@
           <a:p>
             <a:pPr lvl="0"/>
             <a:r>
-              <a:rPr lang="es-MX" noProof="0" smtClean="0"/>
+              <a:rPr lang="es-MX" noProof="0"/>
               <a:t>Click to edit Master text styles</a:t>
             </a:r>
           </a:p>
@@ -2573,7 +2531,7 @@
           <a:p>
             <a:pPr lvl="0"/>
             <a:r>
-              <a:rPr lang="es-MX" noProof="0" smtClean="0"/>
+              <a:rPr lang="es-MX" noProof="0"/>
               <a:t>Click to edit Master title style</a:t>
             </a:r>
           </a:p>
@@ -2635,13 +2593,6 @@
   <p:clrMapOvr>
     <a:masterClrMapping/>
   </p:clrMapOvr>
-  <p:timing>
-    <p:tnLst>
-      <p:par>
-        <p:cTn id="1" dur="indefinite" restart="never" nodeType="tmRoot"/>
-      </p:par>
-    </p:tnLst>
-  </p:timing>
 </p:sldLayout>
 </file>
 
@@ -2724,10 +2675,9 @@
           <a:lstStyle/>
           <a:p>
             <a:r>
-              <a:rPr lang="es-MX" noProof="0" smtClean="0"/>
+              <a:rPr lang="es-MX" noProof="0"/>
               <a:t>Click to edit Master title style</a:t>
             </a:r>
-            <a:endParaRPr lang="es-MX" noProof="0"/>
           </a:p>
         </p:txBody>
       </p:sp>
@@ -2917,7 +2867,7 @@
           </a:lstStyle>
           <a:p>
             <a:pPr lvl="0"/>
-            <a:endParaRPr lang="es-MX" noProof="0" smtClean="0"/>
+            <a:endParaRPr lang="es-MX" noProof="0"/>
           </a:p>
         </p:txBody>
       </p:sp>
@@ -2947,7 +2897,7 @@
           </a:lstStyle>
           <a:p>
             <a:pPr lvl="0"/>
-            <a:endParaRPr lang="es-MX" noProof="0" smtClean="0"/>
+            <a:endParaRPr lang="es-MX" noProof="0"/>
           </a:p>
         </p:txBody>
       </p:sp>
@@ -2977,7 +2927,7 @@
           </a:lstStyle>
           <a:p>
             <a:pPr lvl="0"/>
-            <a:endParaRPr lang="es-MX" noProof="0" smtClean="0"/>
+            <a:endParaRPr lang="es-MX" noProof="0"/>
           </a:p>
         </p:txBody>
       </p:sp>
@@ -3007,7 +2957,7 @@
           </a:lstStyle>
           <a:p>
             <a:pPr lvl="0"/>
-            <a:endParaRPr lang="es-MX" noProof="0" smtClean="0"/>
+            <a:endParaRPr lang="es-MX" noProof="0"/>
           </a:p>
         </p:txBody>
       </p:sp>
@@ -3055,10 +3005,9 @@
           <a:p>
             <a:pPr algn="ctr"/>
             <a:r>
-              <a:rPr lang="es-MX" noProof="0" smtClean="0"/>
+              <a:rPr lang="es-MX" noProof="0"/>
               <a:t> </a:t>
             </a:r>
-            <a:endParaRPr lang="es-MX" noProof="0"/>
           </a:p>
         </p:txBody>
       </p:sp>
@@ -3096,14 +3045,14 @@
           <a:p>
             <a:pPr lvl="0"/>
             <a:r>
-              <a:rPr lang="es-MX" noProof="0" smtClean="0"/>
+              <a:rPr lang="es-MX" noProof="0"/>
               <a:t>Click to edit Master text</a:t>
             </a:r>
             <a:br>
-              <a:rPr lang="es-MX" noProof="0" smtClean="0"/>
+              <a:rPr lang="es-MX" noProof="0"/>
             </a:br>
             <a:r>
-              <a:rPr lang="es-MX" noProof="0" smtClean="0"/>
+              <a:rPr lang="es-MX" noProof="0"/>
               <a:t>styles</a:t>
             </a:r>
           </a:p>
@@ -3119,13 +3068,6 @@
   <p:clrMapOvr>
     <a:masterClrMapping/>
   </p:clrMapOvr>
-  <p:timing>
-    <p:tnLst>
-      <p:par>
-        <p:cTn id="1" dur="indefinite" restart="never" nodeType="tmRoot"/>
-      </p:par>
-    </p:tnLst>
-  </p:timing>
 </p:sldLayout>
 </file>
 
@@ -3253,10 +3195,9 @@
           <a:lstStyle/>
           <a:p>
             <a:r>
-              <a:rPr lang="es-MX" noProof="0" smtClean="0"/>
+              <a:rPr lang="es-MX" noProof="0"/>
               <a:t>Click to edit Master title style</a:t>
             </a:r>
-            <a:endParaRPr lang="es-MX" noProof="0"/>
           </a:p>
         </p:txBody>
       </p:sp>
@@ -3293,7 +3234,7 @@
           <a:p>
             <a:pPr lvl="0"/>
             <a:r>
-              <a:rPr lang="es-MX" noProof="0" smtClean="0"/>
+              <a:rPr lang="es-MX" noProof="0"/>
               <a:t>Click to edit Master text styles</a:t>
             </a:r>
           </a:p>
@@ -3378,7 +3319,7 @@
           <a:p>
             <a:pPr lvl="0"/>
             <a:r>
-              <a:rPr lang="es-MX" noProof="0" smtClean="0"/>
+              <a:rPr lang="es-MX" noProof="0"/>
               <a:t>Click to edit Master text styles</a:t>
             </a:r>
           </a:p>
@@ -3462,7 +3403,7 @@
           <a:p>
             <a:pPr lvl="0"/>
             <a:r>
-              <a:rPr lang="es-MX" noProof="0" smtClean="0"/>
+              <a:rPr lang="es-MX" noProof="0"/>
               <a:t>Click to edit Master text styles</a:t>
             </a:r>
           </a:p>
@@ -3546,7 +3487,7 @@
           <a:p>
             <a:pPr lvl="0"/>
             <a:r>
-              <a:rPr lang="es-MX" noProof="0" smtClean="0"/>
+              <a:rPr lang="es-MX" noProof="0"/>
               <a:t>Click to edit Master text styles</a:t>
             </a:r>
           </a:p>
@@ -3630,7 +3571,7 @@
           <a:p>
             <a:pPr lvl="0"/>
             <a:r>
-              <a:rPr lang="es-MX" noProof="0" smtClean="0"/>
+              <a:rPr lang="es-MX" noProof="0"/>
               <a:t>Click to edit Master text styles</a:t>
             </a:r>
           </a:p>
@@ -3664,7 +3605,7 @@
           <a:p>
             <a:pPr lvl="0"/>
             <a:r>
-              <a:rPr lang="es-MX" noProof="0" smtClean="0"/>
+              <a:rPr lang="es-MX" noProof="0"/>
               <a:t>Click to edit Master text styles</a:t>
             </a:r>
           </a:p>
@@ -3698,7 +3639,7 @@
           <a:p>
             <a:pPr lvl="0"/>
             <a:r>
-              <a:rPr lang="es-MX" noProof="0" smtClean="0"/>
+              <a:rPr lang="es-MX" noProof="0"/>
               <a:t>Click to edit Master text styles</a:t>
             </a:r>
           </a:p>
@@ -3732,7 +3673,7 @@
           <a:p>
             <a:pPr lvl="0"/>
             <a:r>
-              <a:rPr lang="es-MX" noProof="0" smtClean="0"/>
+              <a:rPr lang="es-MX" noProof="0"/>
               <a:t>Click to edit Master text styles</a:t>
             </a:r>
           </a:p>
@@ -3766,7 +3707,7 @@
           <a:p>
             <a:pPr lvl="0"/>
             <a:r>
-              <a:rPr lang="es-MX" noProof="0" smtClean="0"/>
+              <a:rPr lang="es-MX" noProof="0"/>
               <a:t>Click to edit Master text styles</a:t>
             </a:r>
           </a:p>
@@ -3800,7 +3741,7 @@
           <a:p>
             <a:pPr lvl="0"/>
             <a:r>
-              <a:rPr lang="es-MX" noProof="0" smtClean="0"/>
+              <a:rPr lang="es-MX" noProof="0"/>
               <a:t>Click to edit Master text styles</a:t>
             </a:r>
           </a:p>
@@ -3816,13 +3757,6 @@
   <p:clrMapOvr>
     <a:masterClrMapping/>
   </p:clrMapOvr>
-  <p:timing>
-    <p:tnLst>
-      <p:par>
-        <p:cTn id="1" dur="indefinite" restart="never" nodeType="tmRoot"/>
-      </p:par>
-    </p:tnLst>
-  </p:timing>
 </p:sldLayout>
 </file>
 
@@ -4277,10 +4211,9 @@
           <a:lstStyle/>
           <a:p>
             <a:r>
-              <a:rPr lang="es-MX" noProof="0" smtClean="0"/>
+              <a:rPr lang="es-MX" noProof="0"/>
               <a:t>Click to edit Master title style</a:t>
             </a:r>
-            <a:endParaRPr lang="es-MX" noProof="0"/>
           </a:p>
         </p:txBody>
       </p:sp>
@@ -4315,7 +4248,7 @@
           <a:p>
             <a:pPr lvl="0"/>
             <a:r>
-              <a:rPr lang="es-MX" noProof="0" smtClean="0"/>
+              <a:rPr lang="es-MX" noProof="0"/>
               <a:t>Click to edit Master text styles</a:t>
             </a:r>
           </a:p>
@@ -4365,7 +4298,7 @@
           <a:p>
             <a:pPr lvl="0"/>
             <a:r>
-              <a:rPr lang="es-MX" noProof="0" smtClean="0"/>
+              <a:rPr lang="es-MX" noProof="0"/>
               <a:t>Click to edit Master text styles</a:t>
             </a:r>
           </a:p>
@@ -4388,7 +4321,7 @@
               <a:defRPr/>
             </a:pPr>
             <a:r>
-              <a:rPr lang="es-MX" noProof="0" smtClean="0"/>
+              <a:rPr lang="es-MX" noProof="0"/>
               <a:t>Click to edit Master text styles</a:t>
             </a:r>
           </a:p>
@@ -4411,7 +4344,7 @@
               <a:defRPr/>
             </a:pPr>
             <a:r>
-              <a:rPr lang="es-MX" noProof="0" smtClean="0"/>
+              <a:rPr lang="es-MX" noProof="0"/>
               <a:t>Click to edit Master text styles</a:t>
             </a:r>
           </a:p>
@@ -4434,7 +4367,7 @@
               <a:defRPr/>
             </a:pPr>
             <a:r>
-              <a:rPr lang="es-MX" noProof="0" smtClean="0"/>
+              <a:rPr lang="es-MX" noProof="0"/>
               <a:t>Click to edit Master text styles</a:t>
             </a:r>
           </a:p>
@@ -4457,25 +4390,25 @@
               <a:defRPr/>
             </a:pPr>
             <a:r>
-              <a:rPr lang="es-MX" noProof="0" smtClean="0"/>
+              <a:rPr lang="es-MX" noProof="0"/>
               <a:t>Click to edit Master text styles</a:t>
             </a:r>
           </a:p>
           <a:p>
             <a:pPr lvl="0"/>
-            <a:endParaRPr lang="es-MX" noProof="0" smtClean="0"/>
+            <a:endParaRPr lang="es-MX" noProof="0"/>
           </a:p>
           <a:p>
             <a:pPr lvl="0"/>
-            <a:endParaRPr lang="es-MX" noProof="0" smtClean="0"/>
+            <a:endParaRPr lang="es-MX" noProof="0"/>
           </a:p>
           <a:p>
             <a:pPr lvl="0"/>
-            <a:endParaRPr lang="es-MX" noProof="0" smtClean="0"/>
+            <a:endParaRPr lang="es-MX" noProof="0"/>
           </a:p>
           <a:p>
             <a:pPr lvl="0"/>
-            <a:endParaRPr lang="es-MX" noProof="0" smtClean="0"/>
+            <a:endParaRPr lang="es-MX" noProof="0"/>
           </a:p>
         </p:txBody>
       </p:sp>
@@ -4510,7 +4443,7 @@
           <a:p>
             <a:pPr lvl="0"/>
             <a:r>
-              <a:rPr lang="es-MX" noProof="0" smtClean="0"/>
+              <a:rPr lang="es-MX" noProof="0"/>
               <a:t>Click to edit Master text styles</a:t>
             </a:r>
           </a:p>
@@ -4560,7 +4493,7 @@
           <a:p>
             <a:pPr lvl="0"/>
             <a:r>
-              <a:rPr lang="es-MX" noProof="0" smtClean="0"/>
+              <a:rPr lang="es-MX" noProof="0"/>
               <a:t>Click to edit Master text styles</a:t>
             </a:r>
           </a:p>
@@ -4583,7 +4516,7 @@
               <a:defRPr/>
             </a:pPr>
             <a:r>
-              <a:rPr lang="es-MX" noProof="0" smtClean="0"/>
+              <a:rPr lang="es-MX" noProof="0"/>
               <a:t>Click to edit Master text styles</a:t>
             </a:r>
           </a:p>
@@ -4606,7 +4539,7 @@
               <a:defRPr/>
             </a:pPr>
             <a:r>
-              <a:rPr lang="es-MX" noProof="0" smtClean="0"/>
+              <a:rPr lang="es-MX" noProof="0"/>
               <a:t>Click to edit Master text styles</a:t>
             </a:r>
           </a:p>
@@ -4629,7 +4562,7 @@
               <a:defRPr/>
             </a:pPr>
             <a:r>
-              <a:rPr lang="es-MX" noProof="0" smtClean="0"/>
+              <a:rPr lang="es-MX" noProof="0"/>
               <a:t>Click to edit Master text styles</a:t>
             </a:r>
           </a:p>
@@ -4652,25 +4585,25 @@
               <a:defRPr/>
             </a:pPr>
             <a:r>
-              <a:rPr lang="es-MX" noProof="0" smtClean="0"/>
+              <a:rPr lang="es-MX" noProof="0"/>
               <a:t>Click to edit Master text styles</a:t>
             </a:r>
           </a:p>
           <a:p>
             <a:pPr lvl="0"/>
-            <a:endParaRPr lang="es-MX" noProof="0" smtClean="0"/>
+            <a:endParaRPr lang="es-MX" noProof="0"/>
           </a:p>
           <a:p>
             <a:pPr lvl="0"/>
-            <a:endParaRPr lang="es-MX" noProof="0" smtClean="0"/>
+            <a:endParaRPr lang="es-MX" noProof="0"/>
           </a:p>
           <a:p>
             <a:pPr lvl="0"/>
-            <a:endParaRPr lang="es-MX" noProof="0" smtClean="0"/>
+            <a:endParaRPr lang="es-MX" noProof="0"/>
           </a:p>
           <a:p>
             <a:pPr lvl="0"/>
-            <a:endParaRPr lang="es-MX" noProof="0" smtClean="0"/>
+            <a:endParaRPr lang="es-MX" noProof="0"/>
           </a:p>
         </p:txBody>
       </p:sp>
@@ -4705,7 +4638,7 @@
           <a:p>
             <a:pPr lvl="0"/>
             <a:r>
-              <a:rPr lang="es-MX" noProof="0" smtClean="0"/>
+              <a:rPr lang="es-MX" noProof="0"/>
               <a:t>Click to edit Master text styles</a:t>
             </a:r>
           </a:p>
@@ -4755,7 +4688,7 @@
           <a:p>
             <a:pPr lvl="0"/>
             <a:r>
-              <a:rPr lang="es-MX" noProof="0" smtClean="0"/>
+              <a:rPr lang="es-MX" noProof="0"/>
               <a:t>Click to edit Master text styles</a:t>
             </a:r>
           </a:p>
@@ -4778,7 +4711,7 @@
               <a:defRPr/>
             </a:pPr>
             <a:r>
-              <a:rPr lang="es-MX" noProof="0" smtClean="0"/>
+              <a:rPr lang="es-MX" noProof="0"/>
               <a:t>Click to edit Master text styles</a:t>
             </a:r>
           </a:p>
@@ -4801,7 +4734,7 @@
               <a:defRPr/>
             </a:pPr>
             <a:r>
-              <a:rPr lang="es-MX" noProof="0" smtClean="0"/>
+              <a:rPr lang="es-MX" noProof="0"/>
               <a:t>Click to edit Master text styles</a:t>
             </a:r>
           </a:p>
@@ -4824,7 +4757,7 @@
               <a:defRPr/>
             </a:pPr>
             <a:r>
-              <a:rPr lang="es-MX" noProof="0" smtClean="0"/>
+              <a:rPr lang="es-MX" noProof="0"/>
               <a:t>Click to edit Master text styles</a:t>
             </a:r>
           </a:p>
@@ -4847,25 +4780,25 @@
               <a:defRPr/>
             </a:pPr>
             <a:r>
-              <a:rPr lang="es-MX" noProof="0" smtClean="0"/>
+              <a:rPr lang="es-MX" noProof="0"/>
               <a:t>Click to edit Master text styles</a:t>
             </a:r>
           </a:p>
           <a:p>
             <a:pPr lvl="0"/>
-            <a:endParaRPr lang="es-MX" noProof="0" smtClean="0"/>
+            <a:endParaRPr lang="es-MX" noProof="0"/>
           </a:p>
           <a:p>
             <a:pPr lvl="0"/>
-            <a:endParaRPr lang="es-MX" noProof="0" smtClean="0"/>
+            <a:endParaRPr lang="es-MX" noProof="0"/>
           </a:p>
           <a:p>
             <a:pPr lvl="0"/>
-            <a:endParaRPr lang="es-MX" noProof="0" smtClean="0"/>
+            <a:endParaRPr lang="es-MX" noProof="0"/>
           </a:p>
           <a:p>
             <a:pPr lvl="0"/>
-            <a:endParaRPr lang="es-MX" noProof="0" smtClean="0"/>
+            <a:endParaRPr lang="es-MX" noProof="0"/>
           </a:p>
         </p:txBody>
       </p:sp>
@@ -4900,7 +4833,7 @@
           <a:p>
             <a:pPr lvl="0"/>
             <a:r>
-              <a:rPr lang="es-MX" noProof="0" smtClean="0"/>
+              <a:rPr lang="es-MX" noProof="0"/>
               <a:t>Click to edit Master text styles</a:t>
             </a:r>
           </a:p>
@@ -4950,7 +4883,7 @@
           <a:p>
             <a:pPr lvl="0"/>
             <a:r>
-              <a:rPr lang="es-MX" noProof="0" smtClean="0"/>
+              <a:rPr lang="es-MX" noProof="0"/>
               <a:t>Click to edit Master text styles</a:t>
             </a:r>
           </a:p>
@@ -4973,7 +4906,7 @@
               <a:defRPr/>
             </a:pPr>
             <a:r>
-              <a:rPr lang="es-MX" noProof="0" smtClean="0"/>
+              <a:rPr lang="es-MX" noProof="0"/>
               <a:t>Click to edit Master text styles</a:t>
             </a:r>
           </a:p>
@@ -4996,7 +4929,7 @@
               <a:defRPr/>
             </a:pPr>
             <a:r>
-              <a:rPr lang="es-MX" noProof="0" smtClean="0"/>
+              <a:rPr lang="es-MX" noProof="0"/>
               <a:t>Click to edit Master text styles</a:t>
             </a:r>
           </a:p>
@@ -5019,7 +4952,7 @@
               <a:defRPr/>
             </a:pPr>
             <a:r>
-              <a:rPr lang="es-MX" noProof="0" smtClean="0"/>
+              <a:rPr lang="es-MX" noProof="0"/>
               <a:t>Click to edit Master text styles</a:t>
             </a:r>
           </a:p>
@@ -5042,25 +4975,25 @@
               <a:defRPr/>
             </a:pPr>
             <a:r>
-              <a:rPr lang="es-MX" noProof="0" smtClean="0"/>
+              <a:rPr lang="es-MX" noProof="0"/>
               <a:t>Click to edit Master text styles</a:t>
             </a:r>
           </a:p>
           <a:p>
             <a:pPr lvl="0"/>
-            <a:endParaRPr lang="es-MX" noProof="0" smtClean="0"/>
+            <a:endParaRPr lang="es-MX" noProof="0"/>
           </a:p>
           <a:p>
             <a:pPr lvl="0"/>
-            <a:endParaRPr lang="es-MX" noProof="0" smtClean="0"/>
+            <a:endParaRPr lang="es-MX" noProof="0"/>
           </a:p>
           <a:p>
             <a:pPr lvl="0"/>
-            <a:endParaRPr lang="es-MX" noProof="0" smtClean="0"/>
+            <a:endParaRPr lang="es-MX" noProof="0"/>
           </a:p>
           <a:p>
             <a:pPr lvl="0"/>
-            <a:endParaRPr lang="es-MX" noProof="0" smtClean="0"/>
+            <a:endParaRPr lang="es-MX" noProof="0"/>
           </a:p>
         </p:txBody>
       </p:sp>
@@ -5074,13 +5007,6 @@
   <p:clrMapOvr>
     <a:masterClrMapping/>
   </p:clrMapOvr>
-  <p:timing>
-    <p:tnLst>
-      <p:par>
-        <p:cTn id="1" dur="indefinite" restart="never" nodeType="tmRoot"/>
-      </p:par>
-    </p:tnLst>
-  </p:timing>
 </p:sldLayout>
 </file>
 
@@ -5141,7 +5067,7 @@
           <a:p>
             <a:pPr lvl="0"/>
             <a:r>
-              <a:rPr lang="es-MX" noProof="0" smtClean="0"/>
+              <a:rPr lang="es-MX" noProof="0"/>
               <a:t>Click to edit Master title style</a:t>
             </a:r>
           </a:p>
@@ -5420,10 +5346,9 @@
           <a:p>
             <a:pPr lvl="0"/>
             <a:r>
-              <a:rPr lang="es-MX" noProof="0" smtClean="0"/>
+              <a:rPr lang="es-MX" noProof="0"/>
               <a:t>At a Glance</a:t>
             </a:r>
-            <a:endParaRPr lang="es-MX" noProof="0"/>
           </a:p>
         </p:txBody>
       </p:sp>
@@ -5454,10 +5379,9 @@
           <a:p>
             <a:pPr lvl="0"/>
             <a:r>
-              <a:rPr lang="es-MX" noProof="0" smtClean="0"/>
+              <a:rPr lang="es-MX" noProof="0"/>
               <a:t>Challenge</a:t>
             </a:r>
-            <a:endParaRPr lang="es-MX" noProof="0"/>
           </a:p>
         </p:txBody>
       </p:sp>
@@ -5488,10 +5412,9 @@
           <a:p>
             <a:pPr lvl="0"/>
             <a:r>
-              <a:rPr lang="es-MX" noProof="0" smtClean="0"/>
+              <a:rPr lang="es-MX" noProof="0"/>
               <a:t>The Solution</a:t>
             </a:r>
-            <a:endParaRPr lang="es-MX" noProof="0"/>
           </a:p>
         </p:txBody>
       </p:sp>
@@ -5526,10 +5449,9 @@
           <a:p>
             <a:pPr lvl="0"/>
             <a:r>
-              <a:rPr lang="es-MX" noProof="0" smtClean="0"/>
+              <a:rPr lang="es-MX" noProof="0"/>
               <a:t>Voice of the Costumer</a:t>
             </a:r>
-            <a:endParaRPr lang="es-MX" noProof="0"/>
           </a:p>
         </p:txBody>
       </p:sp>
@@ -5559,7 +5481,7 @@
           <a:p>
             <a:pPr lvl="0"/>
             <a:r>
-              <a:rPr lang="es-MX" noProof="0" smtClean="0"/>
+              <a:rPr lang="es-MX" noProof="0"/>
               <a:t>Click to edit Master text styles</a:t>
             </a:r>
           </a:p>
@@ -5591,7 +5513,7 @@
           <a:p>
             <a:pPr lvl="0"/>
             <a:r>
-              <a:rPr lang="es-MX" noProof="0" smtClean="0"/>
+              <a:rPr lang="es-MX" noProof="0"/>
               <a:t>Click to edit Master text styles</a:t>
             </a:r>
           </a:p>
@@ -5725,7 +5647,7 @@
           <a:p>
             <a:pPr lvl="0"/>
             <a:r>
-              <a:rPr lang="es-MX" noProof="0" smtClean="0"/>
+              <a:rPr lang="es-MX" noProof="0"/>
               <a:t>Click to edit Master text styles</a:t>
             </a:r>
           </a:p>
@@ -5758,7 +5680,7 @@
           <a:p>
             <a:pPr lvl="0"/>
             <a:r>
-              <a:rPr lang="es-MX" noProof="0" smtClean="0"/>
+              <a:rPr lang="es-MX" noProof="0"/>
               <a:t>Click to edit Master text styles</a:t>
             </a:r>
           </a:p>
@@ -5795,7 +5717,7 @@
           <a:p>
             <a:pPr lvl="0"/>
             <a:r>
-              <a:rPr lang="es-MX" noProof="0" smtClean="0"/>
+              <a:rPr lang="es-MX" noProof="0"/>
               <a:t>Click to edit Master text styles</a:t>
             </a:r>
           </a:p>
@@ -5811,13 +5733,6 @@
   <p:clrMapOvr>
     <a:masterClrMapping/>
   </p:clrMapOvr>
-  <p:timing>
-    <p:tnLst>
-      <p:par>
-        <p:cTn id="1" dur="indefinite" restart="never" nodeType="tmRoot"/>
-      </p:par>
-    </p:tnLst>
-  </p:timing>
 </p:sldLayout>
 </file>
 
@@ -5878,7 +5793,7 @@
           <a:p>
             <a:pPr lvl="0"/>
             <a:r>
-              <a:rPr lang="es-MX" noProof="0" smtClean="0"/>
+              <a:rPr lang="es-MX" noProof="0"/>
               <a:t>Click to edit Master title style</a:t>
             </a:r>
           </a:p>
@@ -6157,10 +6072,9 @@
           <a:p>
             <a:pPr lvl="0"/>
             <a:r>
-              <a:rPr lang="es-MX" noProof="0" smtClean="0"/>
+              <a:rPr lang="es-MX" noProof="0"/>
               <a:t>At a Glance</a:t>
             </a:r>
-            <a:endParaRPr lang="es-MX" noProof="0"/>
           </a:p>
         </p:txBody>
       </p:sp>
@@ -6191,10 +6105,9 @@
           <a:p>
             <a:pPr lvl="0"/>
             <a:r>
-              <a:rPr lang="es-MX" noProof="0" smtClean="0"/>
+              <a:rPr lang="es-MX" noProof="0"/>
               <a:t>Challenge</a:t>
             </a:r>
-            <a:endParaRPr lang="es-MX" noProof="0"/>
           </a:p>
         </p:txBody>
       </p:sp>
@@ -6225,10 +6138,9 @@
           <a:p>
             <a:pPr lvl="0"/>
             <a:r>
-              <a:rPr lang="es-MX" noProof="0" smtClean="0"/>
+              <a:rPr lang="es-MX" noProof="0"/>
               <a:t>The Solution</a:t>
             </a:r>
-            <a:endParaRPr lang="es-MX" noProof="0"/>
           </a:p>
         </p:txBody>
       </p:sp>
@@ -6258,7 +6170,7 @@
           <a:p>
             <a:pPr lvl="0"/>
             <a:r>
-              <a:rPr lang="es-MX" noProof="0" smtClean="0"/>
+              <a:rPr lang="es-MX" noProof="0"/>
               <a:t>Click to edit Master text styles</a:t>
             </a:r>
           </a:p>
@@ -6290,7 +6202,7 @@
           <a:p>
             <a:pPr lvl="0"/>
             <a:r>
-              <a:rPr lang="es-MX" noProof="0" smtClean="0"/>
+              <a:rPr lang="es-MX" noProof="0"/>
               <a:t>Click to edit Master text styles</a:t>
             </a:r>
           </a:p>
@@ -6424,7 +6336,7 @@
           <a:p>
             <a:pPr lvl="0"/>
             <a:r>
-              <a:rPr lang="es-MX" noProof="0" smtClean="0"/>
+              <a:rPr lang="es-MX" noProof="0"/>
               <a:t>Click to edit Master text styles</a:t>
             </a:r>
           </a:p>
@@ -6559,10 +6471,9 @@
           <a:p>
             <a:pPr lvl="0"/>
             <a:r>
-              <a:rPr lang="es-MX" noProof="0" smtClean="0"/>
+              <a:rPr lang="es-MX" noProof="0"/>
               <a:t>Benefits</a:t>
             </a:r>
-            <a:endParaRPr lang="es-MX" noProof="0"/>
           </a:p>
         </p:txBody>
       </p:sp>
@@ -6592,7 +6503,7 @@
           <a:p>
             <a:pPr lvl="0"/>
             <a:r>
-              <a:rPr lang="es-MX" noProof="0" smtClean="0"/>
+              <a:rPr lang="es-MX" noProof="0"/>
               <a:t>Click to edit Master text styles</a:t>
             </a:r>
           </a:p>
@@ -6608,13 +6519,6 @@
   <p:clrMapOvr>
     <a:masterClrMapping/>
   </p:clrMapOvr>
-  <p:timing>
-    <p:tnLst>
-      <p:par>
-        <p:cTn id="1" dur="indefinite" restart="never" nodeType="tmRoot"/>
-      </p:par>
-    </p:tnLst>
-  </p:timing>
 </p:sldLayout>
 </file>
 
@@ -6791,10 +6695,9 @@
           </a:lstStyle>
           <a:p>
             <a:r>
-              <a:rPr lang="es-MX" noProof="0" smtClean="0"/>
+              <a:rPr lang="es-MX" noProof="0"/>
               <a:t>Click To Edit Master Title Style</a:t>
             </a:r>
-            <a:endParaRPr lang="es-MX" noProof="0"/>
           </a:p>
         </p:txBody>
       </p:sp>
@@ -6863,14 +6766,14 @@
           <a:p>
             <a:pPr lvl="0"/>
             <a:r>
-              <a:rPr lang="en-US" noProof="0" smtClean="0"/>
+              <a:rPr lang="en-US" noProof="0"/>
               <a:t>Click to edit Master text styles</a:t>
             </a:r>
           </a:p>
           <a:p>
             <a:pPr lvl="1"/>
             <a:r>
-              <a:rPr lang="en-US" noProof="0" smtClean="0"/>
+              <a:rPr lang="en-US" noProof="0"/>
               <a:t>Second level</a:t>
             </a:r>
           </a:p>
@@ -6975,7 +6878,7 @@
           <a:p>
             <a:pPr algn="l"/>
             <a:r>
-              <a:rPr lang="es-MX" sz="800" noProof="0" smtClean="0">
+              <a:rPr lang="es-MX" sz="800" noProof="0">
                 <a:solidFill>
                   <a:srgbClr val="FFFFFF"/>
                 </a:solidFill>
@@ -6983,12 +6886,6 @@
               </a:rPr>
               <a:t>Todos los Derechos Reservados © Valores Corporativos Softtek S.A. de C.V. 2015. Interno.</a:t>
             </a:r>
-            <a:endParaRPr lang="es-MX" sz="800" noProof="0">
-              <a:solidFill>
-                <a:srgbClr val="FFFFFF"/>
-              </a:solidFill>
-              <a:cs typeface="Arial" charset="0"/>
-            </a:endParaRPr>
           </a:p>
         </p:txBody>
       </p:sp>
@@ -7002,13 +6899,6 @@
   <p:clrMapOvr>
     <a:masterClrMapping/>
   </p:clrMapOvr>
-  <p:timing>
-    <p:tnLst>
-      <p:par>
-        <p:cTn id="1" dur="indefinite" restart="never" nodeType="tmRoot"/>
-      </p:par>
-    </p:tnLst>
-  </p:timing>
 </p:sldLayout>
 </file>
 
@@ -7185,10 +7075,9 @@
           </a:lstStyle>
           <a:p>
             <a:r>
-              <a:rPr lang="es-MX" noProof="0" smtClean="0"/>
+              <a:rPr lang="es-MX" noProof="0"/>
               <a:t>Click To Edit Master Title Style</a:t>
             </a:r>
-            <a:endParaRPr lang="es-MX" noProof="0"/>
           </a:p>
         </p:txBody>
       </p:sp>
@@ -7257,14 +7146,14 @@
           <a:p>
             <a:pPr lvl="0"/>
             <a:r>
-              <a:rPr lang="en-US" noProof="0" smtClean="0"/>
+              <a:rPr lang="en-US" noProof="0"/>
               <a:t>Click to edit Master text styles</a:t>
             </a:r>
           </a:p>
           <a:p>
             <a:pPr lvl="1"/>
             <a:r>
-              <a:rPr lang="en-US" noProof="0" smtClean="0"/>
+              <a:rPr lang="en-US" noProof="0"/>
               <a:t>Second level</a:t>
             </a:r>
           </a:p>
@@ -7369,7 +7258,7 @@
           <a:p>
             <a:pPr algn="l"/>
             <a:r>
-              <a:rPr lang="es-MX" sz="800" noProof="0" smtClean="0">
+              <a:rPr lang="es-MX" sz="800" noProof="0">
                 <a:solidFill>
                   <a:srgbClr val="FFFFFF"/>
                 </a:solidFill>
@@ -7377,12 +7266,6 @@
               </a:rPr>
               <a:t>Todos los Derechos Reservados © Valores Corporativos Softtek S.A. de C.V. 2015. Interno.</a:t>
             </a:r>
-            <a:endParaRPr lang="es-MX" sz="800" noProof="0">
-              <a:solidFill>
-                <a:srgbClr val="FFFFFF"/>
-              </a:solidFill>
-              <a:cs typeface="Arial" charset="0"/>
-            </a:endParaRPr>
           </a:p>
         </p:txBody>
       </p:sp>
@@ -7396,13 +7279,6 @@
   <p:clrMapOvr>
     <a:masterClrMapping/>
   </p:clrMapOvr>
-  <p:timing>
-    <p:tnLst>
-      <p:par>
-        <p:cTn id="1" dur="indefinite" restart="never" nodeType="tmRoot"/>
-      </p:par>
-    </p:tnLst>
-  </p:timing>
 </p:sldLayout>
 </file>
 
@@ -7549,24 +7425,23 @@
           </a:lstStyle>
           <a:p>
             <a:r>
-              <a:rPr lang="es-MX" noProof="0" smtClean="0"/>
+              <a:rPr lang="es-MX" noProof="0"/>
               <a:t>Click to </a:t>
             </a:r>
             <a:br>
-              <a:rPr lang="es-MX" noProof="0" smtClean="0"/>
+              <a:rPr lang="es-MX" noProof="0"/>
             </a:br>
             <a:r>
-              <a:rPr lang="es-MX" noProof="0" smtClean="0"/>
+              <a:rPr lang="es-MX" noProof="0"/>
               <a:t>edit Master </a:t>
             </a:r>
             <a:br>
-              <a:rPr lang="es-MX" noProof="0" smtClean="0"/>
+              <a:rPr lang="es-MX" noProof="0"/>
             </a:br>
             <a:r>
-              <a:rPr lang="es-MX" noProof="0" smtClean="0"/>
+              <a:rPr lang="es-MX" noProof="0"/>
               <a:t>title style</a:t>
             </a:r>
-            <a:endParaRPr lang="es-MX" noProof="0"/>
           </a:p>
         </p:txBody>
       </p:sp>
@@ -7616,7 +7491,7 @@
               <a:defRPr/>
             </a:pPr>
             <a:r>
-              <a:rPr lang="es-MX" sz="800" noProof="0" smtClean="0">
+              <a:rPr lang="es-MX" sz="800" noProof="0">
                 <a:solidFill>
                   <a:schemeClr val="tx1"/>
                 </a:solidFill>
@@ -7657,7 +7532,7 @@
           <a:noFill/>
           <a:extLst>
             <a:ext uri="{909E8E84-426E-40dd-AFC4-6F175D3DCCD1}">
-              <a14:hiddenFill xmlns="" xmlns:a14="http://schemas.microsoft.com/office/drawing/2010/main">
+              <a14:hiddenFill xmlns:a14="http://schemas.microsoft.com/office/drawing/2010/main" xmlns="">
                 <a:solidFill>
                   <a:srgbClr val="FFFFFF"/>
                 </a:solidFill>
@@ -7715,13 +7590,6 @@
   <p:clrMapOvr>
     <a:masterClrMapping/>
   </p:clrMapOvr>
-  <p:timing>
-    <p:tnLst>
-      <p:par>
-        <p:cTn id="1" dur="indefinite" restart="never" nodeType="tmRoot"/>
-      </p:par>
-    </p:tnLst>
-  </p:timing>
 </p:sldLayout>
 </file>
 
@@ -7826,7 +7694,7 @@
           <a:p>
             <a:pPr lvl="0"/>
             <a:r>
-              <a:rPr lang="en-US" noProof="0" smtClean="0"/>
+              <a:rPr lang="en-US" noProof="0"/>
               <a:t>Click to edit Master text styles</a:t>
             </a:r>
           </a:p>
@@ -7889,7 +7757,7 @@
           <a:p>
             <a:pPr lvl="0"/>
             <a:r>
-              <a:rPr lang="en-US" noProof="0" smtClean="0"/>
+              <a:rPr lang="en-US" noProof="0"/>
               <a:t>Click to edit Master text styles</a:t>
             </a:r>
           </a:p>
@@ -7925,7 +7793,7 @@
           <a:noFill/>
           <a:extLst>
             <a:ext uri="{909E8E84-426E-40dd-AFC4-6F175D3DCCD1}">
-              <a14:hiddenFill xmlns="" xmlns:a14="http://schemas.microsoft.com/office/drawing/2010/main">
+              <a14:hiddenFill xmlns:a14="http://schemas.microsoft.com/office/drawing/2010/main" xmlns="">
                 <a:solidFill>
                   <a:srgbClr val="FFFFFF"/>
                 </a:solidFill>
@@ -8019,7 +7887,7 @@
               <a:defRPr/>
             </a:pPr>
             <a:r>
-              <a:rPr lang="es-MX" sz="800" noProof="0" smtClean="0">
+              <a:rPr lang="es-MX" sz="800" noProof="0">
                 <a:solidFill>
                   <a:schemeClr val="tx1"/>
                 </a:solidFill>
@@ -8040,13 +7908,6 @@
   <p:clrMapOvr>
     <a:masterClrMapping/>
   </p:clrMapOvr>
-  <p:timing>
-    <p:tnLst>
-      <p:par>
-        <p:cTn id="1" dur="indefinite" restart="never" nodeType="tmRoot"/>
-      </p:par>
-    </p:tnLst>
-  </p:timing>
 </p:sldLayout>
 </file>
 
@@ -8151,7 +8012,7 @@
           <a:p>
             <a:pPr lvl="0"/>
             <a:r>
-              <a:rPr lang="en-US" noProof="0" smtClean="0"/>
+              <a:rPr lang="en-US" noProof="0"/>
               <a:t>Click to edit Master text styles</a:t>
             </a:r>
           </a:p>
@@ -8214,7 +8075,7 @@
           <a:p>
             <a:pPr lvl="0"/>
             <a:r>
-              <a:rPr lang="en-US" noProof="0" smtClean="0"/>
+              <a:rPr lang="en-US" noProof="0"/>
               <a:t>Click to edit Master text styles</a:t>
             </a:r>
           </a:p>
@@ -8274,7 +8135,7 @@
           <a:p>
             <a:pPr lvl="0"/>
             <a:r>
-              <a:rPr lang="en-US" noProof="0" smtClean="0"/>
+              <a:rPr lang="en-US" noProof="0"/>
               <a:t>Click to edit Master text styles</a:t>
             </a:r>
           </a:p>
@@ -8337,7 +8198,7 @@
           <a:p>
             <a:pPr lvl="0"/>
             <a:r>
-              <a:rPr lang="en-US" noProof="0" smtClean="0"/>
+              <a:rPr lang="en-US" noProof="0"/>
               <a:t>Click to edit Master text styles</a:t>
             </a:r>
           </a:p>
@@ -8397,7 +8258,7 @@
           <a:p>
             <a:pPr lvl="0"/>
             <a:r>
-              <a:rPr lang="en-US" noProof="0" smtClean="0"/>
+              <a:rPr lang="en-US" noProof="0"/>
               <a:t>Click to edit Master text styles</a:t>
             </a:r>
           </a:p>
@@ -8460,7 +8321,7 @@
           <a:p>
             <a:pPr lvl="0"/>
             <a:r>
-              <a:rPr lang="en-US" noProof="0" smtClean="0"/>
+              <a:rPr lang="en-US" noProof="0"/>
               <a:t>Click to edit Master text styles</a:t>
             </a:r>
           </a:p>
@@ -8581,7 +8442,7 @@
               <a:defRPr/>
             </a:pPr>
             <a:r>
-              <a:rPr lang="es-MX" sz="800" noProof="0" smtClean="0">
+              <a:rPr lang="es-MX" sz="800" noProof="0">
                 <a:solidFill>
                   <a:schemeClr val="tx1"/>
                 </a:solidFill>
@@ -8602,13 +8463,6 @@
   <p:clrMapOvr>
     <a:masterClrMapping/>
   </p:clrMapOvr>
-  <p:timing>
-    <p:tnLst>
-      <p:par>
-        <p:cTn id="1" dur="indefinite" restart="never" nodeType="tmRoot"/>
-      </p:par>
-    </p:tnLst>
-  </p:timing>
 </p:sldLayout>
 </file>
 
@@ -8676,7 +8530,7 @@
           <a:p>
             <a:pPr algn="l"/>
             <a:r>
-              <a:rPr lang="es-MX" sz="800" noProof="0" smtClean="0">
+              <a:rPr lang="es-MX" sz="800" noProof="0">
                 <a:solidFill>
                   <a:srgbClr val="FFFFFF"/>
                 </a:solidFill>
@@ -8685,7 +8539,7 @@
               <a:t>Todos los Derechos </a:t>
             </a:r>
             <a:r>
-              <a:rPr lang="es-MX" sz="800" baseline="0" noProof="0" smtClean="0">
+              <a:rPr lang="es-MX" sz="800" baseline="0" noProof="0">
                 <a:solidFill>
                   <a:srgbClr val="FFFFFF"/>
                 </a:solidFill>
@@ -8694,7 +8548,7 @@
               <a:t>Reserva</a:t>
             </a:r>
             <a:r>
-              <a:rPr lang="es-MX" sz="800" noProof="0" smtClean="0">
+              <a:rPr lang="es-MX" sz="800" noProof="0">
                 <a:solidFill>
                   <a:srgbClr val="FFFFFF"/>
                 </a:solidFill>
@@ -8702,12 +8556,6 @@
               </a:rPr>
               <a:t>dos © Valores Corporativos Softtek S.A. de C.V. 2015. Interno.</a:t>
             </a:r>
-            <a:endParaRPr lang="es-MX" sz="800" noProof="0">
-              <a:solidFill>
-                <a:srgbClr val="FFFFFF"/>
-              </a:solidFill>
-              <a:cs typeface="Arial" charset="0"/>
-            </a:endParaRPr>
           </a:p>
         </p:txBody>
       </p:sp>
@@ -8768,7 +8616,7 @@
           <a:p>
             <a:pPr lvl="0"/>
             <a:r>
-              <a:rPr lang="en-US" noProof="0" smtClean="0"/>
+              <a:rPr lang="en-US" noProof="0"/>
               <a:t>Click to edit Master text styles</a:t>
             </a:r>
           </a:p>
@@ -8828,7 +8676,7 @@
           <a:p>
             <a:pPr lvl="0"/>
             <a:r>
-              <a:rPr lang="en-US" noProof="0" smtClean="0"/>
+              <a:rPr lang="en-US" noProof="0"/>
               <a:t>Click to edit Master text styles</a:t>
             </a:r>
           </a:p>
@@ -8891,7 +8739,7 @@
           <a:p>
             <a:pPr lvl="0"/>
             <a:r>
-              <a:rPr lang="en-US" noProof="0" smtClean="0"/>
+              <a:rPr lang="en-US" noProof="0"/>
               <a:t>Click to edit Master text styles</a:t>
             </a:r>
           </a:p>
@@ -8951,7 +8799,7 @@
           <a:p>
             <a:pPr lvl="0"/>
             <a:r>
-              <a:rPr lang="en-US" noProof="0" smtClean="0"/>
+              <a:rPr lang="en-US" noProof="0"/>
               <a:t>Click to edit Master text styles</a:t>
             </a:r>
           </a:p>
@@ -9014,7 +8862,7 @@
           <a:p>
             <a:pPr lvl="0"/>
             <a:r>
-              <a:rPr lang="en-US" noProof="0" smtClean="0"/>
+              <a:rPr lang="en-US" noProof="0"/>
               <a:t>Click to edit Master text styles</a:t>
             </a:r>
           </a:p>
@@ -9077,7 +8925,7 @@
           <a:p>
             <a:pPr lvl="0"/>
             <a:r>
-              <a:rPr lang="en-US" noProof="0" smtClean="0"/>
+              <a:rPr lang="en-US" noProof="0"/>
               <a:t>Click to edit Master text styles</a:t>
             </a:r>
           </a:p>
@@ -9162,13 +9010,6 @@
   <p:clrMapOvr>
     <a:masterClrMapping/>
   </p:clrMapOvr>
-  <p:timing>
-    <p:tnLst>
-      <p:par>
-        <p:cTn id="1" dur="indefinite" restart="never" nodeType="tmRoot"/>
-      </p:par>
-    </p:tnLst>
-  </p:timing>
 </p:sldLayout>
 </file>
 
@@ -9243,7 +9084,7 @@
           <a:p>
             <a:pPr algn="ctr"/>
             <a:r>
-              <a:rPr lang="es-MX" sz="12000" spc="600" noProof="0" smtClean="0">
+              <a:rPr lang="es-MX" sz="12000" spc="600" noProof="0">
                 <a:solidFill>
                   <a:schemeClr val="bg2"/>
                 </a:solidFill>
@@ -9253,7 +9094,7 @@
               <a:t>Q</a:t>
             </a:r>
             <a:r>
-              <a:rPr lang="es-MX" sz="8000" spc="600" baseline="30000" noProof="0" smtClean="0">
+              <a:rPr lang="es-MX" sz="8000" spc="600" baseline="30000" noProof="0">
                 <a:solidFill>
                   <a:schemeClr val="bg2"/>
                 </a:solidFill>
@@ -9263,7 +9104,7 @@
               <a:t>&amp;</a:t>
             </a:r>
             <a:r>
-              <a:rPr lang="es-MX" sz="12000" spc="600" noProof="0" smtClean="0">
+              <a:rPr lang="es-MX" sz="12000" spc="600" noProof="0">
                 <a:solidFill>
                   <a:schemeClr val="bg2"/>
                 </a:solidFill>
@@ -9272,13 +9113,6 @@
               </a:rPr>
               <a:t>A</a:t>
             </a:r>
-            <a:endParaRPr lang="es-MX" sz="12000" spc="600" noProof="0">
-              <a:solidFill>
-                <a:schemeClr val="bg2"/>
-              </a:solidFill>
-              <a:latin typeface="Arial"/>
-              <a:cs typeface="Arial"/>
-            </a:endParaRPr>
           </a:p>
         </p:txBody>
       </p:sp>
@@ -9312,7 +9146,7 @@
           <a:noFill/>
           <a:extLst>
             <a:ext uri="{909E8E84-426E-40dd-AFC4-6F175D3DCCD1}">
-              <a14:hiddenFill xmlns="" xmlns:a14="http://schemas.microsoft.com/office/drawing/2010/main">
+              <a14:hiddenFill xmlns:a14="http://schemas.microsoft.com/office/drawing/2010/main" xmlns="">
                 <a:solidFill>
                   <a:srgbClr val="FFFFFF"/>
                 </a:solidFill>
@@ -9406,7 +9240,7 @@
               <a:defRPr/>
             </a:pPr>
             <a:r>
-              <a:rPr lang="es-MX" sz="800" noProof="0" smtClean="0">
+              <a:rPr lang="es-MX" sz="800" noProof="0">
                 <a:solidFill>
                   <a:schemeClr val="tx1"/>
                 </a:solidFill>
@@ -9427,13 +9261,6 @@
   <p:clrMapOvr>
     <a:masterClrMapping/>
   </p:clrMapOvr>
-  <p:timing>
-    <p:tnLst>
-      <p:par>
-        <p:cTn id="1" dur="indefinite" restart="never" nodeType="tmRoot"/>
-      </p:par>
-    </p:tnLst>
-  </p:timing>
 </p:sldLayout>
 </file>
 
@@ -9494,7 +9321,7 @@
           <a:p>
             <a:pPr lvl="0"/>
             <a:r>
-              <a:rPr lang="es-MX" noProof="0" smtClean="0"/>
+              <a:rPr lang="es-MX" noProof="0"/>
               <a:t>Click to edit Master title style</a:t>
             </a:r>
           </a:p>
@@ -9556,13 +9383,6 @@
   <p:clrMapOvr>
     <a:masterClrMapping/>
   </p:clrMapOvr>
-  <p:timing>
-    <p:tnLst>
-      <p:par>
-        <p:cTn id="1" dur="indefinite" restart="never" nodeType="tmRoot"/>
-      </p:par>
-    </p:tnLst>
-  </p:timing>
 </p:sldLayout>
 </file>
 
@@ -9602,13 +9422,6 @@
     <p:sldLayoutId id="2147485186" r:id="rId8"/>
     <p:sldLayoutId id="2147485198" r:id="rId9"/>
   </p:sldLayoutIdLst>
-  <p:timing>
-    <p:tnLst>
-      <p:par>
-        <p:cTn id="1" dur="indefinite" restart="never" nodeType="tmRoot"/>
-      </p:par>
-    </p:tnLst>
-  </p:timing>
   <p:hf hdr="0" ftr="0" dt="0"/>
   <p:txStyles>
     <p:titleStyle>
@@ -10045,14 +9858,14 @@
           </a:ln>
           <a:extLst>
             <a:ext uri="{909E8E84-426E-40dd-AFC4-6F175D3DCCD1}">
-              <a14:hiddenFill xmlns="" xmlns:a14="http://schemas.microsoft.com/office/drawing/2010/main">
+              <a14:hiddenFill xmlns:a14="http://schemas.microsoft.com/office/drawing/2010/main" xmlns="">
                 <a:solidFill>
                   <a:srgbClr val="FFFFFF"/>
                 </a:solidFill>
               </a14:hiddenFill>
             </a:ext>
             <a:ext uri="{91240B29-F687-4f45-9708-019B960494DF}">
-              <a14:hiddenLine xmlns="" xmlns:a14="http://schemas.microsoft.com/office/drawing/2010/main" w="9525">
+              <a14:hiddenLine xmlns:a14="http://schemas.microsoft.com/office/drawing/2010/main" xmlns="" w="9525">
                 <a:solidFill>
                   <a:srgbClr val="000000"/>
                 </a:solidFill>
@@ -10073,34 +9886,34 @@
           <a:p>
             <a:pPr lvl="0"/>
             <a:r>
-              <a:rPr lang="es-MX" noProof="0" smtClean="0"/>
+              <a:rPr lang="es-MX" noProof="0"/>
               <a:t>Click to edit Master text styles</a:t>
             </a:r>
           </a:p>
           <a:p>
             <a:pPr lvl="1"/>
             <a:r>
-              <a:rPr lang="es-MX" noProof="0" smtClean="0"/>
+              <a:rPr lang="es-MX" noProof="0"/>
               <a:t>Second level</a:t>
             </a:r>
           </a:p>
           <a:p>
             <a:pPr lvl="2"/>
             <a:r>
-              <a:rPr lang="es-MX" noProof="0" smtClean="0"/>
+              <a:rPr lang="es-MX" noProof="0"/>
               <a:t>Third level</a:t>
             </a:r>
           </a:p>
           <a:p>
             <a:pPr lvl="3"/>
             <a:r>
-              <a:rPr lang="es-MX" noProof="0" smtClean="0"/>
+              <a:rPr lang="es-MX" noProof="0"/>
               <a:t>Fourth level</a:t>
             </a:r>
           </a:p>
           <a:p>
             <a:pPr lvl="2"/>
-            <a:endParaRPr lang="es-MX" noProof="0" smtClean="0"/>
+            <a:endParaRPr lang="es-MX" noProof="0"/>
           </a:p>
         </p:txBody>
       </p:sp>
@@ -10128,14 +9941,14 @@
           </a:ln>
           <a:extLst>
             <a:ext uri="{909E8E84-426E-40dd-AFC4-6F175D3DCCD1}">
-              <a14:hiddenFill xmlns="" xmlns:a14="http://schemas.microsoft.com/office/drawing/2010/main">
+              <a14:hiddenFill xmlns:a14="http://schemas.microsoft.com/office/drawing/2010/main" xmlns="">
                 <a:solidFill>
                   <a:srgbClr val="FFFFFF"/>
                 </a:solidFill>
               </a14:hiddenFill>
             </a:ext>
             <a:ext uri="{91240B29-F687-4f45-9708-019B960494DF}">
-              <a14:hiddenLine xmlns="" xmlns:a14="http://schemas.microsoft.com/office/drawing/2010/main" w="9525">
+              <a14:hiddenLine xmlns:a14="http://schemas.microsoft.com/office/drawing/2010/main" xmlns="" w="9525">
                 <a:solidFill>
                   <a:srgbClr val="000000"/>
                 </a:solidFill>
@@ -10156,7 +9969,7 @@
           <a:p>
             <a:pPr lvl="0"/>
             <a:r>
-              <a:rPr lang="es-MX" noProof="0" smtClean="0"/>
+              <a:rPr lang="es-MX" noProof="0"/>
               <a:t>Click to edit Master title style</a:t>
             </a:r>
           </a:p>
@@ -10194,7 +10007,7 @@
           <a:noFill/>
           <a:extLst>
             <a:ext uri="{909E8E84-426E-40dd-AFC4-6F175D3DCCD1}">
-              <a14:hiddenFill xmlns="" xmlns:a14="http://schemas.microsoft.com/office/drawing/2010/main">
+              <a14:hiddenFill xmlns:a14="http://schemas.microsoft.com/office/drawing/2010/main" xmlns="">
                 <a:solidFill>
                   <a:srgbClr val="FFFFFF"/>
                 </a:solidFill>
@@ -10249,19 +10062,19 @@
               <a:defRPr/>
             </a:pPr>
             <a:r>
-              <a:rPr lang="es-MX" sz="800" noProof="0" smtClean="0">
+              <a:rPr lang="es-MX" sz="800" noProof="0">
                 <a:cs typeface="Arial" charset="0"/>
               </a:rPr>
               <a:t>|</a:t>
             </a:r>
             <a:r>
-              <a:rPr lang="es-MX" sz="800" baseline="0" noProof="0" smtClean="0">
+              <a:rPr lang="es-MX" sz="800" baseline="0" noProof="0">
                 <a:cs typeface="Arial" charset="0"/>
               </a:rPr>
               <a:t>  </a:t>
             </a:r>
             <a:r>
-              <a:rPr lang="es-MX" sz="800" noProof="0" smtClean="0">
+              <a:rPr lang="es-MX" sz="800" noProof="0">
                 <a:cs typeface="Arial" charset="0"/>
               </a:rPr>
               <a:t>Todos los Derechos Reservados © Valores Corporativos Softtek S.A. de C.V. 2015. Interno.</a:t>
@@ -10330,13 +10143,6 @@
     <p:sldLayoutId id="2147485190" r:id="rId9"/>
     <p:sldLayoutId id="2147485191" r:id="rId10"/>
   </p:sldLayoutIdLst>
-  <p:timing>
-    <p:tnLst>
-      <p:par>
-        <p:cTn id="1" dur="indefinite" restart="never" nodeType="tmRoot"/>
-      </p:par>
-    </p:tnLst>
-  </p:timing>
   <p:hf hdr="0" ftr="0" dt="0"/>
   <p:txStyles>
     <p:titleStyle>
@@ -10784,10 +10590,9 @@
           <a:lstStyle/>
           <a:p>
             <a:r>
-              <a:rPr lang="es-MX" dirty="0" smtClean="0"/>
+              <a:rPr lang="es-MX" dirty="0"/>
               <a:t>SQL</a:t>
             </a:r>
-            <a:endParaRPr lang="es-MX" dirty="0"/>
           </a:p>
         </p:txBody>
       </p:sp>
@@ -10812,15 +10617,15 @@
           <a:lstStyle/>
           <a:p>
             <a:r>
-              <a:rPr lang="es-MX" dirty="0" err="1" smtClean="0"/>
+              <a:rPr lang="es-MX" dirty="0" err="1"/>
               <a:t>Joins</a:t>
             </a:r>
             <a:r>
-              <a:rPr lang="es-419" dirty="0" smtClean="0"/>
+              <a:rPr lang="es-419" dirty="0"/>
               <a:t> - </a:t>
             </a:r>
             <a:r>
-              <a:rPr lang="es-419" dirty="0" err="1" smtClean="0"/>
+              <a:rPr lang="es-419" dirty="0" err="1"/>
               <a:t>Exercises</a:t>
             </a:r>
             <a:endParaRPr lang="es-MX" dirty="0"/>
@@ -10837,13 +10642,6 @@
   <p:clrMapOvr>
     <a:masterClrMapping/>
   </p:clrMapOvr>
-  <p:timing>
-    <p:tnLst>
-      <p:par>
-        <p:cTn id="1" dur="indefinite" restart="never" nodeType="tmRoot"/>
-      </p:par>
-    </p:tnLst>
-  </p:timing>
 </p:sld>
 </file>
 
@@ -10914,22 +10712,16 @@
           <a:lstStyle/>
           <a:p>
             <a:r>
-              <a:rPr lang="es-419" sz="2000" dirty="0" err="1" smtClean="0">
+              <a:rPr lang="es-419" sz="2000" dirty="0" err="1">
                 <a:latin typeface="+mn-lt"/>
               </a:rPr>
               <a:t>Joins</a:t>
             </a:r>
             <a:r>
-              <a:rPr lang="es-419" sz="2000" dirty="0" smtClean="0">
-                <a:latin typeface="+mn-lt"/>
-              </a:rPr>
-              <a:t> </a:t>
-            </a:r>
-            <a:r>
               <a:rPr lang="es-419" sz="2000" dirty="0">
                 <a:latin typeface="+mn-lt"/>
               </a:rPr>
-              <a:t>- </a:t>
+              <a:t> - </a:t>
             </a:r>
             <a:r>
               <a:rPr lang="es-419" sz="2000" dirty="0" err="1">
@@ -10952,9 +10744,9 @@
         <p:grpSpPr>
           <a:xfrm>
             <a:off x="929426" y="1052736"/>
-            <a:ext cx="5802814" cy="4968552"/>
+            <a:ext cx="5802814" cy="4176464"/>
             <a:chOff x="929426" y="1052736"/>
-            <a:chExt cx="5802814" cy="4968552"/>
+            <a:chExt cx="5802814" cy="4176464"/>
           </a:xfrm>
         </p:grpSpPr>
         <p:sp>
@@ -10966,7 +10758,7 @@
           <p:spPr>
             <a:xfrm>
               <a:off x="929426" y="1052736"/>
-              <a:ext cx="5010726" cy="3693319"/>
+              <a:ext cx="5010726" cy="3139321"/>
             </a:xfrm>
             <a:prstGeom prst="rect">
               <a:avLst/>
@@ -10980,270 +10772,267 @@
             <a:lstStyle/>
             <a:p>
               <a:r>
-                <a:rPr lang="en-US" sz="900" dirty="0" smtClean="0">
+                <a:rPr lang="en-US" sz="900" dirty="0">
                   <a:cs typeface="Courier New" panose="02070309020205020404" pitchFamily="49" charset="0"/>
                 </a:rPr>
                 <a:t>1. Get the </a:t>
               </a:r>
               <a:r>
-                <a:rPr lang="en-US" sz="900" i="1" dirty="0" smtClean="0">
+                <a:rPr lang="en-US" sz="900" i="1" dirty="0">
                   <a:cs typeface="Courier New" panose="02070309020205020404" pitchFamily="49" charset="0"/>
                 </a:rPr>
                 <a:t>number of </a:t>
               </a:r>
               <a:r>
-                <a:rPr lang="es-MX" sz="900" i="1" dirty="0" err="1" smtClean="0">
+                <a:rPr lang="es-MX" sz="900" i="1" dirty="0" err="1">
                   <a:cs typeface="Courier New" panose="02070309020205020404" pitchFamily="49" charset="0"/>
                 </a:rPr>
                 <a:t>carts</a:t>
               </a:r>
               <a:r>
-                <a:rPr lang="es-MX" sz="900" dirty="0" smtClean="0">
+                <a:rPr lang="es-MX" sz="900" dirty="0">
                   <a:cs typeface="Courier New" panose="02070309020205020404" pitchFamily="49" charset="0"/>
                 </a:rPr>
                 <a:t> </a:t>
               </a:r>
               <a:r>
-                <a:rPr lang="es-MX" sz="900" dirty="0" err="1" smtClean="0">
+                <a:rPr lang="es-MX" sz="900" dirty="0" err="1">
                   <a:cs typeface="Courier New" panose="02070309020205020404" pitchFamily="49" charset="0"/>
                 </a:rPr>
                 <a:t>by</a:t>
               </a:r>
               <a:r>
-                <a:rPr lang="es-MX" sz="900" dirty="0" smtClean="0">
+                <a:rPr lang="es-MX" sz="900" dirty="0">
                   <a:cs typeface="Courier New" panose="02070309020205020404" pitchFamily="49" charset="0"/>
                 </a:rPr>
                 <a:t> </a:t>
               </a:r>
               <a:r>
-                <a:rPr lang="es-MX" sz="900" i="1" dirty="0" err="1" smtClean="0">
+                <a:rPr lang="es-MX" sz="900" i="1" dirty="0" err="1">
                   <a:cs typeface="Courier New" panose="02070309020205020404" pitchFamily="49" charset="0"/>
                 </a:rPr>
                 <a:t>ShipTo</a:t>
               </a:r>
               <a:r>
-                <a:rPr lang="es-MX" sz="900" dirty="0" smtClean="0">
+                <a:rPr lang="es-MX" sz="900" dirty="0">
                   <a:cs typeface="Courier New" panose="02070309020205020404" pitchFamily="49" charset="0"/>
                 </a:rPr>
                 <a:t> and </a:t>
               </a:r>
               <a:r>
-                <a:rPr lang="es-MX" sz="900" i="1" dirty="0" smtClean="0">
+                <a:rPr lang="es-MX" sz="900" i="1" dirty="0">
                   <a:cs typeface="Courier New" panose="02070309020205020404" pitchFamily="49" charset="0"/>
                 </a:rPr>
                 <a:t>Status</a:t>
               </a:r>
               <a:r>
-                <a:rPr lang="es-MX" sz="900" dirty="0" smtClean="0">
+                <a:rPr lang="es-MX" sz="900" dirty="0">
                   <a:cs typeface="Courier New" panose="02070309020205020404" pitchFamily="49" charset="0"/>
                 </a:rPr>
                 <a:t>, </a:t>
               </a:r>
               <a:r>
-                <a:rPr lang="es-MX" sz="900" dirty="0" err="1" smtClean="0">
+                <a:rPr lang="es-MX" sz="900" dirty="0" err="1">
                   <a:cs typeface="Courier New" panose="02070309020205020404" pitchFamily="49" charset="0"/>
                 </a:rPr>
                 <a:t>from</a:t>
               </a:r>
               <a:r>
-                <a:rPr lang="es-MX" sz="900" dirty="0" smtClean="0">
+                <a:rPr lang="es-MX" sz="900" dirty="0">
                   <a:cs typeface="Courier New" panose="02070309020205020404" pitchFamily="49" charset="0"/>
                 </a:rPr>
                 <a:t> </a:t>
               </a:r>
               <a:r>
-                <a:rPr lang="es-MX" sz="900" i="1" dirty="0" err="1" smtClean="0">
+                <a:rPr lang="es-MX" sz="900" i="1" dirty="0" err="1">
                   <a:cs typeface="Courier New" panose="02070309020205020404" pitchFamily="49" charset="0"/>
                 </a:rPr>
                 <a:t>Carts</a:t>
               </a:r>
               <a:r>
-                <a:rPr lang="es-MX" sz="900" dirty="0" smtClean="0">
+                <a:rPr lang="es-MX" sz="900" dirty="0">
                   <a:cs typeface="Courier New" panose="02070309020205020404" pitchFamily="49" charset="0"/>
                 </a:rPr>
                 <a:t> “CREATED” and “DELIVERED” and </a:t>
               </a:r>
               <a:r>
-                <a:rPr lang="es-MX" sz="900" dirty="0" err="1" smtClean="0">
+                <a:rPr lang="es-MX" sz="900" dirty="0" err="1">
                   <a:cs typeface="Courier New" panose="02070309020205020404" pitchFamily="49" charset="0"/>
                 </a:rPr>
                 <a:t>which</a:t>
               </a:r>
               <a:r>
-                <a:rPr lang="es-MX" sz="900" dirty="0" smtClean="0">
+                <a:rPr lang="es-MX" sz="900" dirty="0">
                   <a:cs typeface="Courier New" panose="02070309020205020404" pitchFamily="49" charset="0"/>
                 </a:rPr>
                 <a:t> </a:t>
               </a:r>
               <a:r>
-                <a:rPr lang="es-MX" sz="900" dirty="0" err="1" smtClean="0">
+                <a:rPr lang="es-MX" sz="900" dirty="0" err="1">
                   <a:cs typeface="Courier New" panose="02070309020205020404" pitchFamily="49" charset="0"/>
                 </a:rPr>
                 <a:t>the</a:t>
               </a:r>
               <a:r>
-                <a:rPr lang="es-MX" sz="900" dirty="0" smtClean="0">
+                <a:rPr lang="es-MX" sz="900" dirty="0">
                   <a:cs typeface="Courier New" panose="02070309020205020404" pitchFamily="49" charset="0"/>
                 </a:rPr>
                 <a:t> </a:t>
               </a:r>
               <a:r>
-                <a:rPr lang="es-MX" sz="900" dirty="0" err="1" smtClean="0">
+                <a:rPr lang="es-MX" sz="900" dirty="0" err="1">
                   <a:cs typeface="Courier New" panose="02070309020205020404" pitchFamily="49" charset="0"/>
                 </a:rPr>
                 <a:t>average</a:t>
               </a:r>
               <a:r>
-                <a:rPr lang="es-MX" sz="900" dirty="0" smtClean="0">
+                <a:rPr lang="es-MX" sz="900" dirty="0">
                   <a:cs typeface="Courier New" panose="02070309020205020404" pitchFamily="49" charset="0"/>
                 </a:rPr>
                 <a:t> of </a:t>
               </a:r>
               <a:r>
-                <a:rPr lang="es-MX" sz="900" dirty="0" err="1" smtClean="0">
+                <a:rPr lang="es-MX" sz="900" dirty="0" err="1">
                   <a:cs typeface="Courier New" panose="02070309020205020404" pitchFamily="49" charset="0"/>
                 </a:rPr>
                 <a:t>cart_amount</a:t>
               </a:r>
               <a:r>
-                <a:rPr lang="es-MX" sz="900" dirty="0" smtClean="0">
+                <a:rPr lang="es-MX" sz="900" dirty="0">
                   <a:cs typeface="Courier New" panose="02070309020205020404" pitchFamily="49" charset="0"/>
                 </a:rPr>
                 <a:t> </a:t>
               </a:r>
               <a:r>
-                <a:rPr lang="es-MX" sz="900" dirty="0" err="1" smtClean="0">
+                <a:rPr lang="es-MX" sz="900" dirty="0" err="1">
                   <a:cs typeface="Courier New" panose="02070309020205020404" pitchFamily="49" charset="0"/>
                 </a:rPr>
                 <a:t>on</a:t>
               </a:r>
               <a:r>
-                <a:rPr lang="es-MX" sz="900" dirty="0" smtClean="0">
+                <a:rPr lang="es-MX" sz="900" dirty="0">
                   <a:cs typeface="Courier New" panose="02070309020205020404" pitchFamily="49" charset="0"/>
                 </a:rPr>
                 <a:t> </a:t>
               </a:r>
               <a:r>
-                <a:rPr lang="es-MX" sz="900" dirty="0" err="1" smtClean="0">
+                <a:rPr lang="es-MX" sz="900" dirty="0" err="1">
                   <a:cs typeface="Courier New" panose="02070309020205020404" pitchFamily="49" charset="0"/>
                 </a:rPr>
                 <a:t>each</a:t>
               </a:r>
               <a:r>
-                <a:rPr lang="es-MX" sz="900" dirty="0" smtClean="0">
+                <a:rPr lang="es-MX" sz="900" dirty="0">
                   <a:cs typeface="Courier New" panose="02070309020205020404" pitchFamily="49" charset="0"/>
                 </a:rPr>
                 <a:t> </a:t>
               </a:r>
               <a:r>
-                <a:rPr lang="es-MX" sz="900" dirty="0" err="1" smtClean="0">
+                <a:rPr lang="es-MX" sz="900" dirty="0" err="1">
                   <a:cs typeface="Courier New" panose="02070309020205020404" pitchFamily="49" charset="0"/>
                 </a:rPr>
                 <a:t>group</a:t>
               </a:r>
               <a:r>
-                <a:rPr lang="es-MX" sz="900" dirty="0" smtClean="0">
+                <a:rPr lang="es-MX" sz="900" dirty="0">
                   <a:cs typeface="Courier New" panose="02070309020205020404" pitchFamily="49" charset="0"/>
                 </a:rPr>
                 <a:t> </a:t>
               </a:r>
               <a:r>
-                <a:rPr lang="es-MX" sz="900" dirty="0" err="1" smtClean="0">
+                <a:rPr lang="es-MX" sz="900" dirty="0" err="1">
                   <a:cs typeface="Courier New" panose="02070309020205020404" pitchFamily="49" charset="0"/>
                 </a:rPr>
                 <a:t>is</a:t>
               </a:r>
               <a:r>
-                <a:rPr lang="es-MX" sz="900" dirty="0" smtClean="0">
+                <a:rPr lang="es-MX" sz="900" dirty="0">
                   <a:cs typeface="Courier New" panose="02070309020205020404" pitchFamily="49" charset="0"/>
                 </a:rPr>
                 <a:t> </a:t>
               </a:r>
               <a:r>
-                <a:rPr lang="es-MX" sz="900" dirty="0" err="1" smtClean="0">
+                <a:rPr lang="es-MX" sz="900" dirty="0" err="1">
                   <a:cs typeface="Courier New" panose="02070309020205020404" pitchFamily="49" charset="0"/>
                 </a:rPr>
                 <a:t>between</a:t>
               </a:r>
               <a:r>
-                <a:rPr lang="es-MX" sz="900" dirty="0" smtClean="0">
+                <a:rPr lang="es-MX" sz="900" dirty="0">
                   <a:cs typeface="Courier New" panose="02070309020205020404" pitchFamily="49" charset="0"/>
                 </a:rPr>
                 <a:t> $ 3,000 and $ 15,000.</a:t>
               </a:r>
             </a:p>
             <a:p>
-              <a:endParaRPr lang="es-419" sz="900" dirty="0" smtClean="0">
+              <a:endParaRPr lang="es-419" sz="900" dirty="0">
                 <a:cs typeface="Courier New" panose="02070309020205020404" pitchFamily="49" charset="0"/>
               </a:endParaRPr>
             </a:p>
             <a:p>
               <a:r>
-                <a:rPr lang="es-419" sz="900" dirty="0" err="1" smtClean="0">
+                <a:rPr lang="es-419" sz="900" dirty="0" err="1">
                   <a:cs typeface="Courier New" panose="02070309020205020404" pitchFamily="49" charset="0"/>
                 </a:rPr>
                 <a:t>Include</a:t>
               </a:r>
               <a:r>
-                <a:rPr lang="es-419" sz="900" dirty="0" smtClean="0">
+                <a:rPr lang="es-419" sz="900" dirty="0">
                   <a:cs typeface="Courier New" panose="02070309020205020404" pitchFamily="49" charset="0"/>
                 </a:rPr>
                 <a:t> </a:t>
               </a:r>
               <a:r>
-                <a:rPr lang="es-419" sz="900" dirty="0" err="1" smtClean="0">
+                <a:rPr lang="es-419" sz="900" dirty="0" err="1">
                   <a:cs typeface="Courier New" panose="02070309020205020404" pitchFamily="49" charset="0"/>
                 </a:rPr>
                 <a:t>the</a:t>
               </a:r>
               <a:r>
-                <a:rPr lang="es-419" sz="900" dirty="0" smtClean="0">
+                <a:rPr lang="es-419" sz="900" dirty="0">
                   <a:cs typeface="Courier New" panose="02070309020205020404" pitchFamily="49" charset="0"/>
                 </a:rPr>
                 <a:t> </a:t>
               </a:r>
               <a:r>
-                <a:rPr lang="es-419" sz="900" dirty="0" err="1" smtClean="0">
+                <a:rPr lang="es-419" sz="900" dirty="0" err="1">
                   <a:cs typeface="Courier New" panose="02070309020205020404" pitchFamily="49" charset="0"/>
                 </a:rPr>
                 <a:t>relevant</a:t>
               </a:r>
               <a:r>
-                <a:rPr lang="es-419" sz="900" dirty="0" smtClean="0">
+                <a:rPr lang="es-419" sz="900" dirty="0">
                   <a:cs typeface="Courier New" panose="02070309020205020404" pitchFamily="49" charset="0"/>
                 </a:rPr>
                 <a:t> </a:t>
               </a:r>
               <a:r>
-                <a:rPr lang="es-419" sz="900" dirty="0" err="1" smtClean="0">
+                <a:rPr lang="es-419" sz="900" dirty="0" err="1">
                   <a:cs typeface="Courier New" panose="02070309020205020404" pitchFamily="49" charset="0"/>
                 </a:rPr>
                 <a:t>description</a:t>
               </a:r>
               <a:r>
-                <a:rPr lang="es-419" sz="900" dirty="0" smtClean="0">
+                <a:rPr lang="es-419" sz="900" dirty="0">
                   <a:cs typeface="Courier New" panose="02070309020205020404" pitchFamily="49" charset="0"/>
                 </a:rPr>
                 <a:t> for </a:t>
               </a:r>
               <a:r>
-                <a:rPr lang="es-419" sz="900" dirty="0" err="1" smtClean="0">
+                <a:rPr lang="es-419" sz="900" dirty="0" err="1">
                   <a:cs typeface="Courier New" panose="02070309020205020404" pitchFamily="49" charset="0"/>
                 </a:rPr>
                 <a:t>ShipTo</a:t>
               </a:r>
               <a:r>
-                <a:rPr lang="es-419" sz="900" dirty="0" smtClean="0">
+                <a:rPr lang="es-419" sz="900" dirty="0">
                   <a:cs typeface="Courier New" panose="02070309020205020404" pitchFamily="49" charset="0"/>
                 </a:rPr>
                 <a:t> and Status.</a:t>
               </a:r>
-              <a:endParaRPr lang="es-419" sz="900" dirty="0">
-                <a:cs typeface="Courier New" panose="02070309020205020404" pitchFamily="49" charset="0"/>
-              </a:endParaRPr>
             </a:p>
             <a:p>
-              <a:endParaRPr lang="en-US" sz="900" dirty="0" smtClean="0">
+              <a:endParaRPr lang="en-US" sz="900" dirty="0">
                 <a:cs typeface="Courier New" panose="02070309020205020404" pitchFamily="49" charset="0"/>
               </a:endParaRPr>
             </a:p>
@@ -11481,16 +11270,7 @@
                   <a:latin typeface="Courier New" panose="02070309020205020404" pitchFamily="49" charset="0"/>
                   <a:cs typeface="Courier New" panose="02070309020205020404" pitchFamily="49" charset="0"/>
                 </a:rPr>
-                <a:t>INNER JOIN user u</a:t>
-              </a:r>
-            </a:p>
-            <a:p>
-              <a:r>
-                <a:rPr lang="en-US" sz="900" dirty="0">
-                  <a:latin typeface="Courier New" panose="02070309020205020404" pitchFamily="49" charset="0"/>
-                  <a:cs typeface="Courier New" panose="02070309020205020404" pitchFamily="49" charset="0"/>
-                </a:rPr>
-                <a:t>    ON </a:t>
+                <a:t> INNER JOIN user u ON </a:t>
               </a:r>
               <a:r>
                 <a:rPr lang="en-US" sz="900" dirty="0" err="1">
@@ -11547,18 +11327,12 @@
                 </a:rPr>
                 <a:t>st</a:t>
               </a:r>
-              <a:endParaRPr lang="en-US" sz="900" dirty="0">
-                <a:latin typeface="Courier New" panose="02070309020205020404" pitchFamily="49" charset="0"/>
-                <a:cs typeface="Courier New" panose="02070309020205020404" pitchFamily="49" charset="0"/>
-              </a:endParaRPr>
-            </a:p>
-            <a:p>
               <a:r>
                 <a:rPr lang="en-US" sz="900" dirty="0">
                   <a:latin typeface="Courier New" panose="02070309020205020404" pitchFamily="49" charset="0"/>
                   <a:cs typeface="Courier New" panose="02070309020205020404" pitchFamily="49" charset="0"/>
                 </a:rPr>
-                <a:t>    ON </a:t>
+                <a:t> ON </a:t>
               </a:r>
               <a:r>
                 <a:rPr lang="en-US" sz="900" dirty="0" err="1">
@@ -11592,16 +11366,7 @@
                   <a:latin typeface="Courier New" panose="02070309020205020404" pitchFamily="49" charset="0"/>
                   <a:cs typeface="Courier New" panose="02070309020205020404" pitchFamily="49" charset="0"/>
                 </a:rPr>
-                <a:t> INNER JOIN status s</a:t>
-              </a:r>
-            </a:p>
-            <a:p>
-              <a:r>
-                <a:rPr lang="en-US" sz="900" dirty="0">
-                  <a:latin typeface="Courier New" panose="02070309020205020404" pitchFamily="49" charset="0"/>
-                  <a:cs typeface="Courier New" panose="02070309020205020404" pitchFamily="49" charset="0"/>
-                </a:rPr>
-                <a:t>    ON </a:t>
+                <a:t> INNER JOIN status s ON </a:t>
               </a:r>
               <a:r>
                 <a:rPr lang="en-US" sz="900" dirty="0" err="1">
@@ -11635,14 +11400,14 @@
                   <a:latin typeface="Courier New" panose="02070309020205020404" pitchFamily="49" charset="0"/>
                   <a:cs typeface="Courier New" panose="02070309020205020404" pitchFamily="49" charset="0"/>
                 </a:rPr>
-                <a:t> WHERE c.   </a:t>
+                <a:t> WHERE </a:t>
               </a:r>
               <a:r>
                 <a:rPr lang="en-US" sz="900" dirty="0" err="1">
                   <a:latin typeface="Courier New" panose="02070309020205020404" pitchFamily="49" charset="0"/>
                   <a:cs typeface="Courier New" panose="02070309020205020404" pitchFamily="49" charset="0"/>
                 </a:rPr>
-                <a:t>status_id</a:t>
+                <a:t>c.status_id</a:t>
               </a:r>
               <a:r>
                 <a:rPr lang="en-US" sz="900" dirty="0">
@@ -11667,18 +11432,12 @@
                 </a:rPr>
                 <a:t>c.ship_to_id</a:t>
               </a:r>
-              <a:endParaRPr lang="en-US" sz="900" dirty="0">
-                <a:latin typeface="Courier New" panose="02070309020205020404" pitchFamily="49" charset="0"/>
-                <a:cs typeface="Courier New" panose="02070309020205020404" pitchFamily="49" charset="0"/>
-              </a:endParaRPr>
-            </a:p>
-            <a:p>
               <a:r>
                 <a:rPr lang="en-US" sz="900" dirty="0">
                   <a:latin typeface="Courier New" panose="02070309020205020404" pitchFamily="49" charset="0"/>
                   <a:cs typeface="Courier New" panose="02070309020205020404" pitchFamily="49" charset="0"/>
                 </a:rPr>
-                <a:t>     , </a:t>
+                <a:t>, </a:t>
               </a:r>
               <a:r>
                 <a:rPr lang="en-US" sz="900" dirty="0" err="1">
@@ -11733,7 +11492,7 @@
           </p:blipFill>
           <p:spPr>
             <a:xfrm>
-              <a:off x="971600" y="5123211"/>
+              <a:off x="971600" y="4331123"/>
               <a:ext cx="5760640" cy="898077"/>
             </a:xfrm>
             <a:prstGeom prst="rect">
@@ -11757,13 +11516,6 @@
   <p:clrMapOvr>
     <a:masterClrMapping/>
   </p:clrMapOvr>
-  <p:timing>
-    <p:tnLst>
-      <p:par>
-        <p:cTn id="1" dur="indefinite" restart="never" nodeType="tmRoot"/>
-      </p:par>
-    </p:tnLst>
-  </p:timing>
 </p:sld>
 </file>
 
@@ -11834,22 +11586,16 @@
           <a:lstStyle/>
           <a:p>
             <a:r>
-              <a:rPr lang="es-419" sz="2000" dirty="0" err="1" smtClean="0">
+              <a:rPr lang="es-419" sz="2000" dirty="0" err="1">
                 <a:latin typeface="+mn-lt"/>
               </a:rPr>
               <a:t>Joins</a:t>
             </a:r>
             <a:r>
-              <a:rPr lang="es-419" sz="2000" dirty="0" smtClean="0">
-                <a:latin typeface="+mn-lt"/>
-              </a:rPr>
-              <a:t> </a:t>
-            </a:r>
-            <a:r>
               <a:rPr lang="es-419" sz="2000" dirty="0">
                 <a:latin typeface="+mn-lt"/>
               </a:rPr>
-              <a:t>- </a:t>
+              <a:t> - </a:t>
             </a:r>
             <a:r>
               <a:rPr lang="es-419" sz="2000" dirty="0" err="1">
@@ -11871,8 +11617,8 @@
         </p:nvSpPr>
         <p:spPr>
           <a:xfrm>
-            <a:off x="929426" y="1491749"/>
-            <a:ext cx="3498558" cy="2585323"/>
+            <a:off x="323528" y="1491749"/>
+            <a:ext cx="4464496" cy="1892826"/>
           </a:xfrm>
           <a:prstGeom prst="rect">
             <a:avLst/>
@@ -11886,187 +11632,169 @@
           <a:lstStyle/>
           <a:p>
             <a:r>
-              <a:rPr lang="en-US" sz="900" dirty="0" smtClean="0">
+              <a:rPr lang="en-US" sz="900" dirty="0">
                 <a:cs typeface="Courier New" panose="02070309020205020404" pitchFamily="49" charset="0"/>
               </a:rPr>
-              <a:t>2. </a:t>
-            </a:r>
-            <a:r>
-              <a:rPr lang="en-US" sz="900" dirty="0" smtClean="0">
-                <a:cs typeface="Courier New" panose="02070309020205020404" pitchFamily="49" charset="0"/>
-              </a:rPr>
-              <a:t>Get </a:t>
-            </a:r>
-            <a:r>
-              <a:rPr lang="en-US" sz="900" dirty="0" smtClean="0">
-                <a:cs typeface="Courier New" panose="02070309020205020404" pitchFamily="49" charset="0"/>
-              </a:rPr>
-              <a:t>the </a:t>
-            </a:r>
-            <a:r>
-              <a:rPr lang="en-US" sz="900" i="1" dirty="0" smtClean="0">
+              <a:t>2. Get the </a:t>
+            </a:r>
+            <a:r>
+              <a:rPr lang="en-US" sz="900" i="1" dirty="0">
                 <a:cs typeface="Courier New" panose="02070309020205020404" pitchFamily="49" charset="0"/>
               </a:rPr>
               <a:t>number of </a:t>
             </a:r>
             <a:r>
-              <a:rPr lang="es-MX" sz="900" i="1" dirty="0" err="1" smtClean="0">
+              <a:rPr lang="es-MX" sz="900" i="1" dirty="0" err="1">
                 <a:cs typeface="Courier New" panose="02070309020205020404" pitchFamily="49" charset="0"/>
               </a:rPr>
               <a:t>Items</a:t>
             </a:r>
             <a:r>
-              <a:rPr lang="es-MX" sz="900" dirty="0" smtClean="0">
+              <a:rPr lang="es-MX" sz="900" dirty="0">
                 <a:cs typeface="Courier New" panose="02070309020205020404" pitchFamily="49" charset="0"/>
               </a:rPr>
               <a:t> </a:t>
             </a:r>
             <a:r>
-              <a:rPr lang="es-MX" sz="900" dirty="0" err="1" smtClean="0">
+              <a:rPr lang="es-MX" sz="900" dirty="0" err="1">
                 <a:cs typeface="Courier New" panose="02070309020205020404" pitchFamily="49" charset="0"/>
               </a:rPr>
               <a:t>by</a:t>
             </a:r>
             <a:r>
-              <a:rPr lang="es-MX" sz="900" dirty="0" smtClean="0">
+              <a:rPr lang="es-MX" sz="900" dirty="0">
                 <a:cs typeface="Courier New" panose="02070309020205020404" pitchFamily="49" charset="0"/>
               </a:rPr>
               <a:t> </a:t>
             </a:r>
             <a:r>
-              <a:rPr lang="es-MX" sz="900" i="1" dirty="0" err="1" smtClean="0">
+              <a:rPr lang="es-MX" sz="900" i="1" dirty="0" err="1">
                 <a:cs typeface="Courier New" panose="02070309020205020404" pitchFamily="49" charset="0"/>
               </a:rPr>
               <a:t>Category</a:t>
             </a:r>
             <a:r>
-              <a:rPr lang="es-MX" sz="900" dirty="0" smtClean="0">
+              <a:rPr lang="es-MX" sz="900" dirty="0">
+                <a:cs typeface="Courier New" panose="02070309020205020404" pitchFamily="49" charset="0"/>
+              </a:rPr>
+              <a:t> and </a:t>
+            </a:r>
+            <a:r>
+              <a:rPr lang="es-MX" sz="900" i="1" dirty="0" err="1">
+                <a:cs typeface="Courier New" panose="02070309020205020404" pitchFamily="49" charset="0"/>
+              </a:rPr>
+              <a:t>UnitOfMeasure</a:t>
+            </a:r>
+            <a:r>
+              <a:rPr lang="es-MX" sz="900" dirty="0">
+                <a:cs typeface="Courier New" panose="02070309020205020404" pitchFamily="49" charset="0"/>
+              </a:rPr>
+              <a:t>. </a:t>
+            </a:r>
+          </a:p>
+          <a:p>
+            <a:endParaRPr lang="es-MX" sz="900" dirty="0">
+              <a:cs typeface="Courier New" panose="02070309020205020404" pitchFamily="49" charset="0"/>
+            </a:endParaRPr>
+          </a:p>
+          <a:p>
+            <a:r>
+              <a:rPr lang="es-MX" sz="900" dirty="0" err="1">
+                <a:cs typeface="Courier New" panose="02070309020205020404" pitchFamily="49" charset="0"/>
+              </a:rPr>
+              <a:t>Sort</a:t>
+            </a:r>
+            <a:r>
+              <a:rPr lang="es-MX" sz="900" dirty="0">
                 <a:cs typeface="Courier New" panose="02070309020205020404" pitchFamily="49" charset="0"/>
               </a:rPr>
               <a:t> </a:t>
             </a:r>
             <a:r>
-              <a:rPr lang="es-MX" sz="900" dirty="0" smtClean="0">
+              <a:rPr lang="es-MX" sz="900" dirty="0" err="1">
                 <a:cs typeface="Courier New" panose="02070309020205020404" pitchFamily="49" charset="0"/>
               </a:rPr>
-              <a:t>and </a:t>
-            </a:r>
-            <a:r>
-              <a:rPr lang="es-MX" sz="900" i="1" dirty="0" err="1" smtClean="0">
-                <a:cs typeface="Courier New" panose="02070309020205020404" pitchFamily="49" charset="0"/>
-              </a:rPr>
-              <a:t>UnitOfMeasure</a:t>
-            </a:r>
-            <a:r>
-              <a:rPr lang="es-MX" sz="900" dirty="0" smtClean="0">
-                <a:cs typeface="Courier New" panose="02070309020205020404" pitchFamily="49" charset="0"/>
-              </a:rPr>
-              <a:t>. </a:t>
-            </a:r>
-          </a:p>
-          <a:p>
-            <a:endParaRPr lang="es-MX" sz="900" dirty="0">
-              <a:cs typeface="Courier New" panose="02070309020205020404" pitchFamily="49" charset="0"/>
-            </a:endParaRPr>
-          </a:p>
-          <a:p>
-            <a:r>
-              <a:rPr lang="es-MX" sz="900" dirty="0" err="1" smtClean="0">
-                <a:cs typeface="Courier New" panose="02070309020205020404" pitchFamily="49" charset="0"/>
-              </a:rPr>
-              <a:t>Sort</a:t>
-            </a:r>
-            <a:r>
-              <a:rPr lang="es-MX" sz="900" dirty="0" smtClean="0">
+              <a:t>the</a:t>
+            </a:r>
+            <a:r>
+              <a:rPr lang="es-MX" sz="900" dirty="0">
                 <a:cs typeface="Courier New" panose="02070309020205020404" pitchFamily="49" charset="0"/>
               </a:rPr>
               <a:t> </a:t>
             </a:r>
             <a:r>
-              <a:rPr lang="es-MX" sz="900" dirty="0" err="1" smtClean="0">
+              <a:rPr lang="es-MX" sz="900" dirty="0" err="1">
                 <a:cs typeface="Courier New" panose="02070309020205020404" pitchFamily="49" charset="0"/>
               </a:rPr>
-              <a:t>the</a:t>
-            </a:r>
-            <a:r>
-              <a:rPr lang="es-MX" sz="900" dirty="0" smtClean="0">
+              <a:t>result</a:t>
+            </a:r>
+            <a:r>
+              <a:rPr lang="es-MX" sz="900" dirty="0">
                 <a:cs typeface="Courier New" panose="02070309020205020404" pitchFamily="49" charset="0"/>
               </a:rPr>
               <a:t> </a:t>
             </a:r>
             <a:r>
-              <a:rPr lang="es-MX" sz="900" dirty="0" err="1" smtClean="0">
+              <a:rPr lang="es-MX" sz="900" dirty="0" err="1">
                 <a:cs typeface="Courier New" panose="02070309020205020404" pitchFamily="49" charset="0"/>
               </a:rPr>
-              <a:t>result</a:t>
-            </a:r>
-            <a:r>
-              <a:rPr lang="es-MX" sz="900" dirty="0" smtClean="0">
+              <a:t>by</a:t>
+            </a:r>
+            <a:r>
+              <a:rPr lang="es-MX" sz="900" dirty="0">
                 <a:cs typeface="Courier New" panose="02070309020205020404" pitchFamily="49" charset="0"/>
               </a:rPr>
               <a:t> </a:t>
             </a:r>
             <a:r>
-              <a:rPr lang="es-MX" sz="900" dirty="0" err="1" smtClean="0">
+              <a:rPr lang="es-MX" sz="900" i="1" dirty="0" err="1">
+                <a:cs typeface="Courier New" panose="02070309020205020404" pitchFamily="49" charset="0"/>
+              </a:rPr>
+              <a:t>Category</a:t>
+            </a:r>
+            <a:r>
+              <a:rPr lang="es-MX" sz="900" dirty="0">
+                <a:cs typeface="Courier New" panose="02070309020205020404" pitchFamily="49" charset="0"/>
+              </a:rPr>
+              <a:t> and </a:t>
+            </a:r>
+            <a:r>
+              <a:rPr lang="es-MX" sz="900" dirty="0" err="1">
+                <a:cs typeface="Courier New" panose="02070309020205020404" pitchFamily="49" charset="0"/>
+              </a:rPr>
+              <a:t>then</a:t>
+            </a:r>
+            <a:r>
+              <a:rPr lang="es-MX" sz="900" dirty="0">
+                <a:cs typeface="Courier New" panose="02070309020205020404" pitchFamily="49" charset="0"/>
+              </a:rPr>
+              <a:t> </a:t>
+            </a:r>
+            <a:r>
+              <a:rPr lang="es-MX" sz="900" dirty="0" err="1">
                 <a:cs typeface="Courier New" panose="02070309020205020404" pitchFamily="49" charset="0"/>
               </a:rPr>
               <a:t>by</a:t>
             </a:r>
             <a:r>
-              <a:rPr lang="es-MX" sz="900" dirty="0" smtClean="0">
+              <a:rPr lang="es-MX" sz="900" dirty="0">
                 <a:cs typeface="Courier New" panose="02070309020205020404" pitchFamily="49" charset="0"/>
               </a:rPr>
               <a:t> </a:t>
             </a:r>
             <a:r>
-              <a:rPr lang="es-MX" sz="900" i="1" dirty="0" err="1" smtClean="0">
-                <a:cs typeface="Courier New" panose="02070309020205020404" pitchFamily="49" charset="0"/>
-              </a:rPr>
-              <a:t>Category</a:t>
-            </a:r>
-            <a:r>
-              <a:rPr lang="es-MX" sz="900" dirty="0" smtClean="0">
-                <a:cs typeface="Courier New" panose="02070309020205020404" pitchFamily="49" charset="0"/>
-              </a:rPr>
-              <a:t> and </a:t>
-            </a:r>
-            <a:r>
-              <a:rPr lang="es-MX" sz="900" dirty="0" err="1" smtClean="0">
-                <a:cs typeface="Courier New" panose="02070309020205020404" pitchFamily="49" charset="0"/>
-              </a:rPr>
-              <a:t>then</a:t>
-            </a:r>
-            <a:r>
-              <a:rPr lang="es-MX" sz="900" dirty="0" smtClean="0">
-                <a:cs typeface="Courier New" panose="02070309020205020404" pitchFamily="49" charset="0"/>
-              </a:rPr>
-              <a:t> </a:t>
-            </a:r>
-            <a:r>
-              <a:rPr lang="es-MX" sz="900" dirty="0" err="1" smtClean="0">
-                <a:cs typeface="Courier New" panose="02070309020205020404" pitchFamily="49" charset="0"/>
-              </a:rPr>
-              <a:t>by</a:t>
-            </a:r>
-            <a:r>
-              <a:rPr lang="es-MX" sz="900" dirty="0" smtClean="0">
-                <a:cs typeface="Courier New" panose="02070309020205020404" pitchFamily="49" charset="0"/>
-              </a:rPr>
-              <a:t> </a:t>
-            </a:r>
-            <a:r>
-              <a:rPr lang="es-MX" sz="900" i="1" dirty="0" smtClean="0">
+              <a:rPr lang="es-MX" sz="900" i="1" dirty="0">
                 <a:cs typeface="Courier New" panose="02070309020205020404" pitchFamily="49" charset="0"/>
               </a:rPr>
               <a:t>UOM</a:t>
             </a:r>
             <a:r>
-              <a:rPr lang="es-MX" sz="900" dirty="0" smtClean="0">
+              <a:rPr lang="es-MX" sz="900" dirty="0">
                 <a:cs typeface="Courier New" panose="02070309020205020404" pitchFamily="49" charset="0"/>
               </a:rPr>
               <a:t>.</a:t>
             </a:r>
-            <a:endParaRPr lang="en-US" sz="900" dirty="0" smtClean="0">
+            <a:endParaRPr lang="en-US" sz="900" dirty="0">
               <a:cs typeface="Courier New" panose="02070309020205020404" pitchFamily="49" charset="0"/>
             </a:endParaRPr>
           </a:p>
@@ -12184,16 +11912,7 @@
                 <a:latin typeface="Courier New" panose="02070309020205020404" pitchFamily="49" charset="0"/>
                 <a:cs typeface="Courier New" panose="02070309020205020404" pitchFamily="49" charset="0"/>
               </a:rPr>
-              <a:t> ci</a:t>
-            </a:r>
-          </a:p>
-          <a:p>
-            <a:r>
-              <a:rPr lang="en-US" sz="900" dirty="0">
-                <a:latin typeface="Courier New" panose="02070309020205020404" pitchFamily="49" charset="0"/>
-                <a:cs typeface="Courier New" panose="02070309020205020404" pitchFamily="49" charset="0"/>
-              </a:rPr>
-              <a:t>    ON </a:t>
+              <a:t> ci ON </a:t>
             </a:r>
             <a:r>
               <a:rPr lang="en-US" sz="900" dirty="0" err="1">
@@ -12236,18 +11955,12 @@
               </a:rPr>
               <a:t>i</a:t>
             </a:r>
-            <a:endParaRPr lang="en-US" sz="900" dirty="0">
-              <a:latin typeface="Courier New" panose="02070309020205020404" pitchFamily="49" charset="0"/>
-              <a:cs typeface="Courier New" panose="02070309020205020404" pitchFamily="49" charset="0"/>
-            </a:endParaRPr>
-          </a:p>
-          <a:p>
             <a:r>
               <a:rPr lang="en-US" sz="900" dirty="0">
                 <a:latin typeface="Courier New" panose="02070309020205020404" pitchFamily="49" charset="0"/>
                 <a:cs typeface="Courier New" panose="02070309020205020404" pitchFamily="49" charset="0"/>
               </a:rPr>
-              <a:t>    ON </a:t>
+              <a:t> ON </a:t>
             </a:r>
             <a:r>
               <a:rPr lang="en-US" sz="900" dirty="0" err="1">
@@ -12290,25 +12003,19 @@
               </a:rPr>
               <a:t>uom</a:t>
             </a:r>
-            <a:endParaRPr lang="en-US" sz="900" dirty="0">
-              <a:latin typeface="Courier New" panose="02070309020205020404" pitchFamily="49" charset="0"/>
-              <a:cs typeface="Courier New" panose="02070309020205020404" pitchFamily="49" charset="0"/>
-            </a:endParaRPr>
-          </a:p>
-          <a:p>
             <a:r>
               <a:rPr lang="en-US" sz="900" dirty="0">
                 <a:latin typeface="Courier New" panose="02070309020205020404" pitchFamily="49" charset="0"/>
                 <a:cs typeface="Courier New" panose="02070309020205020404" pitchFamily="49" charset="0"/>
               </a:rPr>
-              <a:t>    ON </a:t>
-            </a:r>
-            <a:r>
-              <a:rPr lang="en-US" sz="900" dirty="0" err="1">
+              <a:t> ON </a:t>
+            </a:r>
+            <a:r>
+              <a:rPr lang="en-US" sz="900">
                 <a:latin typeface="Courier New" panose="02070309020205020404" pitchFamily="49" charset="0"/>
                 <a:cs typeface="Courier New" panose="02070309020205020404" pitchFamily="49" charset="0"/>
               </a:rPr>
-              <a:t>I.uom_id</a:t>
+              <a:t>i.uom_id</a:t>
             </a:r>
             <a:r>
               <a:rPr lang="en-US" sz="900" dirty="0">
@@ -12335,16 +12042,7 @@
                 <a:latin typeface="Courier New" panose="02070309020205020404" pitchFamily="49" charset="0"/>
                 <a:cs typeface="Courier New" panose="02070309020205020404" pitchFamily="49" charset="0"/>
               </a:rPr>
-              <a:t> GROUP BY category</a:t>
-            </a:r>
-          </a:p>
-          <a:p>
-            <a:r>
-              <a:rPr lang="en-US" sz="900" dirty="0">
-                <a:latin typeface="Courier New" panose="02070309020205020404" pitchFamily="49" charset="0"/>
-                <a:cs typeface="Courier New" panose="02070309020205020404" pitchFamily="49" charset="0"/>
-              </a:rPr>
-              <a:t>     , </a:t>
+              <a:t> GROUP BY category, </a:t>
             </a:r>
             <a:r>
               <a:rPr lang="en-US" sz="900" dirty="0" err="1">
@@ -12364,16 +12062,7 @@
                 <a:latin typeface="Courier New" panose="02070309020205020404" pitchFamily="49" charset="0"/>
                 <a:cs typeface="Courier New" panose="02070309020205020404" pitchFamily="49" charset="0"/>
               </a:rPr>
-              <a:t> ORDER BY category</a:t>
-            </a:r>
-          </a:p>
-          <a:p>
-            <a:r>
-              <a:rPr lang="en-US" sz="900" dirty="0">
-                <a:latin typeface="Courier New" panose="02070309020205020404" pitchFamily="49" charset="0"/>
-                <a:cs typeface="Courier New" panose="02070309020205020404" pitchFamily="49" charset="0"/>
-              </a:rPr>
-              <a:t>     , </a:t>
+              <a:t> ORDER BY category, </a:t>
             </a:r>
             <a:r>
               <a:rPr lang="en-US" sz="900" dirty="0" err="1">
@@ -12389,10 +12078,6 @@
               </a:rPr>
               <a:t>;</a:t>
             </a:r>
-            <a:endParaRPr lang="en-US" sz="900" dirty="0">
-              <a:latin typeface="Courier New" panose="02070309020205020404" pitchFamily="49" charset="0"/>
-              <a:cs typeface="Courier New" panose="02070309020205020404" pitchFamily="49" charset="0"/>
-            </a:endParaRPr>
           </a:p>
         </p:txBody>
       </p:sp>
@@ -12412,7 +12097,7 @@
         </p:blipFill>
         <p:spPr>
           <a:xfrm>
-            <a:off x="4644008" y="1268760"/>
+            <a:off x="5687008" y="1268760"/>
             <a:ext cx="2197360" cy="3029694"/>
           </a:xfrm>
           <a:prstGeom prst="rect">
@@ -12435,13 +12120,6 @@
   <p:clrMapOvr>
     <a:masterClrMapping/>
   </p:clrMapOvr>
-  <p:timing>
-    <p:tnLst>
-      <p:par>
-        <p:cTn id="1" dur="indefinite" restart="never" nodeType="tmRoot"/>
-      </p:par>
-    </p:tnLst>
-  </p:timing>
 </p:sld>
 </file>
 
@@ -12574,13 +12252,6 @@
   <p:clrMapOvr>
     <a:masterClrMapping/>
   </p:clrMapOvr>
-  <p:timing>
-    <p:tnLst>
-      <p:par>
-        <p:cTn id="1" dur="indefinite" restart="never" nodeType="tmRoot"/>
-      </p:par>
-    </p:tnLst>
-  </p:timing>
 </p:sld>
 </file>
 
@@ -13613,6 +13284,23 @@
 </file>
 
 <file path=customXml/item1.xml><?xml version="1.0" encoding="utf-8"?>
+<p:properties xmlns:p="http://schemas.microsoft.com/office/2006/metadata/properties" xmlns:xsi="http://www.w3.org/2001/XMLSchema-instance" xmlns:pc="http://schemas.microsoft.com/office/infopath/2007/PartnerControls">
+  <documentManagement>
+    <Data_x0020_Classification1 xmlns="90e5e253-50b2-47e0-ab40-088f51eedbac">Public</Data_x0020_Classification1>
+  </documentManagement>
+</p:properties>
+</file>
+
+<file path=customXml/item2.xml><?xml version="1.0" encoding="utf-8"?>
+<?mso-contentType ?>
+<FormTemplates xmlns="http://schemas.microsoft.com/sharepoint/v3/contenttype/forms">
+  <Display>DocumentLibraryForm</Display>
+  <Edit>DocumentLibraryForm</Edit>
+  <New>DocumentLibraryForm</New>
+</FormTemplates>
+</file>
+
+<file path=customXml/item3.xml><?xml version="1.0" encoding="utf-8"?>
 <ct:contentTypeSchema xmlns:ct="http://schemas.microsoft.com/office/2006/metadata/contentType" xmlns:ma="http://schemas.microsoft.com/office/2006/metadata/properties/metaAttributes" ct:_="" ma:_="" ma:contentTypeName="Document" ma:contentTypeID="0x010100BF73FF7AA600A74DA303202E068F3B98" ma:contentTypeVersion="0" ma:contentTypeDescription="Create a new document." ma:contentTypeScope="" ma:versionID="15e34d513bc1c5922fdc1b75015e707c">
   <xsd:schema xmlns:xsd="http://www.w3.org/2001/XMLSchema" xmlns:xs="http://www.w3.org/2001/XMLSchema" xmlns:p="http://schemas.microsoft.com/office/2006/metadata/properties" xmlns:ns2="90e5e253-50b2-47e0-ab40-088f51eedbac" targetNamespace="http://schemas.microsoft.com/office/2006/metadata/properties" ma:root="true" ma:fieldsID="7895aa71ad85a7a2616823a07b65eac8" ns2:_="">
     <xsd:import namespace="90e5e253-50b2-47e0-ab40-088f51eedbac"/>
@@ -13743,24 +13431,31 @@
 </ct:contentTypeSchema>
 </file>
 
-<file path=customXml/item2.xml><?xml version="1.0" encoding="utf-8"?>
-<?mso-contentType ?>
-<FormTemplates xmlns="http://schemas.microsoft.com/sharepoint/v3/contenttype/forms">
-  <Display>DocumentLibraryForm</Display>
-  <Edit>DocumentLibraryForm</Edit>
-  <New>DocumentLibraryForm</New>
-</FormTemplates>
+<file path=customXml/itemProps1.xml><?xml version="1.0" encoding="utf-8"?>
+<ds:datastoreItem xmlns:ds="http://schemas.openxmlformats.org/officeDocument/2006/customXml" ds:itemID="{F878CFFA-FA4D-496F-B8D2-C7DD46C2A279}">
+  <ds:schemaRefs>
+    <ds:schemaRef ds:uri="http://purl.org/dc/dcmitype/"/>
+    <ds:schemaRef ds:uri="http://purl.org/dc/elements/1.1/"/>
+    <ds:schemaRef ds:uri="http://www.w3.org/XML/1998/namespace"/>
+    <ds:schemaRef ds:uri="http://schemas.microsoft.com/office/2006/documentManagement/types"/>
+    <ds:schemaRef ds:uri="90e5e253-50b2-47e0-ab40-088f51eedbac"/>
+    <ds:schemaRef ds:uri="http://schemas.openxmlformats.org/package/2006/metadata/core-properties"/>
+    <ds:schemaRef ds:uri="http://schemas.microsoft.com/office/infopath/2007/PartnerControls"/>
+    <ds:schemaRef ds:uri="http://schemas.microsoft.com/office/2006/metadata/properties"/>
+    <ds:schemaRef ds:uri="http://purl.org/dc/terms/"/>
+  </ds:schemaRefs>
+</ds:datastoreItem>
 </file>
 
-<file path=customXml/item3.xml><?xml version="1.0" encoding="utf-8"?>
-<p:properties xmlns:p="http://schemas.microsoft.com/office/2006/metadata/properties" xmlns:xsi="http://www.w3.org/2001/XMLSchema-instance" xmlns:pc="http://schemas.microsoft.com/office/infopath/2007/PartnerControls">
-  <documentManagement>
-    <Data_x0020_Classification1 xmlns="90e5e253-50b2-47e0-ab40-088f51eedbac">Public</Data_x0020_Classification1>
-  </documentManagement>
-</p:properties>
+<file path=customXml/itemProps2.xml><?xml version="1.0" encoding="utf-8"?>
+<ds:datastoreItem xmlns:ds="http://schemas.openxmlformats.org/officeDocument/2006/customXml" ds:itemID="{9D25E79C-CB22-414C-9E48-01ED10321A76}">
+  <ds:schemaRefs>
+    <ds:schemaRef ds:uri="http://schemas.microsoft.com/sharepoint/v3/contenttype/forms"/>
+  </ds:schemaRefs>
+</ds:datastoreItem>
 </file>
 
-<file path=customXml/itemProps1.xml><?xml version="1.0" encoding="utf-8"?>
+<file path=customXml/itemProps3.xml><?xml version="1.0" encoding="utf-8"?>
 <ds:datastoreItem xmlns:ds="http://schemas.openxmlformats.org/officeDocument/2006/customXml" ds:itemID="{42AE7D4F-FA53-4617-A082-86779C2B9BEF}">
   <ds:schemaRefs>
     <ds:schemaRef ds:uri="http://schemas.microsoft.com/office/2006/metadata/contentType"/>
@@ -13776,28 +13471,4 @@
     <ds:schemaRef ds:uri="http://schemas.microsoft.com/internal/obd"/>
   </ds:schemaRefs>
 </ds:datastoreItem>
-</file>
-
-<file path=customXml/itemProps2.xml><?xml version="1.0" encoding="utf-8"?>
-<ds:datastoreItem xmlns:ds="http://schemas.openxmlformats.org/officeDocument/2006/customXml" ds:itemID="{9D25E79C-CB22-414C-9E48-01ED10321A76}">
-  <ds:schemaRefs>
-    <ds:schemaRef ds:uri="http://schemas.microsoft.com/sharepoint/v3/contenttype/forms"/>
-  </ds:schemaRefs>
-</ds:datastoreItem>
-</file>
-
-<file path=customXml/itemProps3.xml><?xml version="1.0" encoding="utf-8"?>
-<ds:datastoreItem xmlns:ds="http://schemas.openxmlformats.org/officeDocument/2006/customXml" ds:itemID="{F878CFFA-FA4D-496F-B8D2-C7DD46C2A279}">
-  <ds:schemaRefs>
-    <ds:schemaRef ds:uri="http://purl.org/dc/dcmitype/"/>
-    <ds:schemaRef ds:uri="http://purl.org/dc/elements/1.1/"/>
-    <ds:schemaRef ds:uri="http://www.w3.org/XML/1998/namespace"/>
-    <ds:schemaRef ds:uri="http://schemas.microsoft.com/office/2006/documentManagement/types"/>
-    <ds:schemaRef ds:uri="90e5e253-50b2-47e0-ab40-088f51eedbac"/>
-    <ds:schemaRef ds:uri="http://schemas.openxmlformats.org/package/2006/metadata/core-properties"/>
-    <ds:schemaRef ds:uri="http://schemas.microsoft.com/office/infopath/2007/PartnerControls"/>
-    <ds:schemaRef ds:uri="http://schemas.microsoft.com/office/2006/metadata/properties"/>
-    <ds:schemaRef ds:uri="http://purl.org/dc/terms/"/>
-  </ds:schemaRefs>
-</ds:datastoreItem>
 </file>
</xml_diff>